<commit_message>
versao final, pos apresentação
</commit_message>
<xml_diff>
--- a/apresentação/Apresentação.pptx
+++ b/apresentação/Apresentação.pptx
@@ -134,7 +134,7 @@
   </p:defaultTextStyle>
   <p:extLst>
     <p:ext uri="{EFAFB233-063F-42B5-8137-9DF3F51BA10A}">
-      <p15:sldGuideLst xmlns:p15="http://schemas.microsoft.com/office/powerpoint/2012/main" xmlns="">
+      <p15:sldGuideLst xmlns="" xmlns:p15="http://schemas.microsoft.com/office/powerpoint/2012/main">
         <p15:guide id="1" orient="horz" pos="2160">
           <p15:clr>
             <a:srgbClr val="A4A3A4"/>
@@ -234,7 +234,7 @@
             <a:fld id="{218263C8-CAE2-452B-807D-4C703AE228A9}" type="datetimeFigureOut">
               <a:rPr lang="pt-BR" smtClean="0"/>
               <a:pPr/>
-              <a:t>02/03/2018</a:t>
+              <a:t>06/03/2018</a:t>
             </a:fld>
             <a:endParaRPr lang="pt-BR"/>
           </a:p>
@@ -720,7 +720,7 @@
             <a:fld id="{1D7B8B0D-CDBB-4942-BC3E-BDC885F34957}" type="datetime1">
               <a:rPr lang="pt-BR" smtClean="0"/>
               <a:pPr/>
-              <a:t>02/03/2018</a:t>
+              <a:t>06/03/2018</a:t>
             </a:fld>
             <a:endParaRPr lang="pt-BR"/>
           </a:p>
@@ -896,7 +896,7 @@
             <a:fld id="{B075492A-4FA5-4A15-91D8-9462636EA097}" type="datetime1">
               <a:rPr lang="pt-BR" smtClean="0"/>
               <a:pPr/>
-              <a:t>02/03/2018</a:t>
+              <a:t>06/03/2018</a:t>
             </a:fld>
             <a:endParaRPr lang="pt-BR"/>
           </a:p>
@@ -1082,7 +1082,7 @@
             <a:fld id="{D7D750F9-D17F-4A3A-B336-82E9E5E36056}" type="datetime1">
               <a:rPr lang="pt-BR" smtClean="0"/>
               <a:pPr/>
-              <a:t>02/03/2018</a:t>
+              <a:t>06/03/2018</a:t>
             </a:fld>
             <a:endParaRPr lang="pt-BR"/>
           </a:p>
@@ -1258,7 +1258,7 @@
             <a:fld id="{F18B65B7-74A1-4119-84DA-90926486EA44}" type="datetime1">
               <a:rPr lang="pt-BR" smtClean="0"/>
               <a:pPr/>
-              <a:t>02/03/2018</a:t>
+              <a:t>06/03/2018</a:t>
             </a:fld>
             <a:endParaRPr lang="pt-BR"/>
           </a:p>
@@ -1540,7 +1540,7 @@
             <a:fld id="{FDD286B5-6D8D-4EA5-8AAB-CDA8C13F810D}" type="datetime1">
               <a:rPr lang="pt-BR" smtClean="0"/>
               <a:pPr/>
-              <a:t>02/03/2018</a:t>
+              <a:t>06/03/2018</a:t>
             </a:fld>
             <a:endParaRPr lang="pt-BR"/>
           </a:p>
@@ -1778,7 +1778,7 @@
             <a:fld id="{BC63E735-0179-41E7-8DC3-74CED378217D}" type="datetime1">
               <a:rPr lang="pt-BR" smtClean="0"/>
               <a:pPr/>
-              <a:t>02/03/2018</a:t>
+              <a:t>06/03/2018</a:t>
             </a:fld>
             <a:endParaRPr lang="pt-BR"/>
           </a:p>
@@ -2151,7 +2151,7 @@
             <a:fld id="{59AA998E-87EE-4A03-B319-74F214514B6B}" type="datetime1">
               <a:rPr lang="pt-BR" smtClean="0"/>
               <a:pPr/>
-              <a:t>02/03/2018</a:t>
+              <a:t>06/03/2018</a:t>
             </a:fld>
             <a:endParaRPr lang="pt-BR"/>
           </a:p>
@@ -2275,7 +2275,7 @@
             <a:fld id="{BEE091FC-907C-4326-AFD0-FCF8C2FCD8C6}" type="datetime1">
               <a:rPr lang="pt-BR" smtClean="0"/>
               <a:pPr/>
-              <a:t>02/03/2018</a:t>
+              <a:t>06/03/2018</a:t>
             </a:fld>
             <a:endParaRPr lang="pt-BR"/>
           </a:p>
@@ -2376,7 +2376,7 @@
             <a:fld id="{88CA3AC6-0146-4B9A-8317-06DA962E26B3}" type="datetime1">
               <a:rPr lang="pt-BR" smtClean="0"/>
               <a:pPr/>
-              <a:t>02/03/2018</a:t>
+              <a:t>06/03/2018</a:t>
             </a:fld>
             <a:endParaRPr lang="pt-BR"/>
           </a:p>
@@ -2659,7 +2659,7 @@
             <a:fld id="{6AA6AB33-8A5F-4EB0-8265-64AD54D2922F}" type="datetime1">
               <a:rPr lang="pt-BR" smtClean="0"/>
               <a:pPr/>
-              <a:t>02/03/2018</a:t>
+              <a:t>06/03/2018</a:t>
             </a:fld>
             <a:endParaRPr lang="pt-BR"/>
           </a:p>
@@ -2918,7 +2918,7 @@
             <a:fld id="{59D83328-E52B-496D-8D9B-1EB9C9BF2321}" type="datetime1">
               <a:rPr lang="pt-BR" smtClean="0"/>
               <a:pPr/>
-              <a:t>02/03/2018</a:t>
+              <a:t>06/03/2018</a:t>
             </a:fld>
             <a:endParaRPr lang="pt-BR"/>
           </a:p>
@@ -3137,7 +3137,7 @@
             <a:fld id="{884AA605-E3A0-4E4E-A893-06E068C17BFB}" type="datetime1">
               <a:rPr lang="pt-BR" smtClean="0"/>
               <a:pPr/>
-              <a:t>02/03/2018</a:t>
+              <a:t>06/03/2018</a:t>
             </a:fld>
             <a:endParaRPr lang="pt-BR"/>
           </a:p>
@@ -8893,52 +8893,18 @@
       </p:sp>
       <p:sp>
         <p:nvSpPr>
-          <p:cNvPr id="8" name="Espaço Reservado para Rodapé 9"/>
-          <p:cNvSpPr>
-            <a:spLocks noGrp="1"/>
-          </p:cNvSpPr>
-          <p:nvPr>
-            <p:ph type="ftr" sz="quarter" idx="11"/>
-          </p:nvPr>
-        </p:nvSpPr>
-        <p:spPr>
-          <a:xfrm>
-            <a:off x="4038600" y="6356350"/>
-            <a:ext cx="4114800" cy="365125"/>
-          </a:xfrm>
-        </p:spPr>
-        <p:txBody>
-          <a:bodyPr/>
-          <a:lstStyle/>
-          <a:p>
-            <a:r>
-              <a:rPr lang="pt-BR" dirty="0" smtClean="0"/>
-              <a:t>Manaus (AM) – Fevereiro de 2018</a:t>
-            </a:r>
-            <a:endParaRPr lang="pt-BR" dirty="0"/>
-          </a:p>
-        </p:txBody>
-      </p:sp>
-      <p:sp>
-        <p:nvSpPr>
-          <p:cNvPr id="10" name="Retângulo 9"/>
+          <p:cNvPr id="2" name="Retângulo 1"/>
           <p:cNvSpPr/>
           <p:nvPr/>
         </p:nvSpPr>
         <p:spPr>
           <a:xfrm>
-            <a:off x="566669" y="1694328"/>
-            <a:ext cx="11050073" cy="4590561"/>
+            <a:off x="5463451" y="2533157"/>
+            <a:ext cx="757253" cy="322118"/>
           </a:xfrm>
           <a:prstGeom prst="rect">
             <a:avLst/>
           </a:prstGeom>
-          <a:noFill/>
-          <a:ln w="28575">
-            <a:solidFill>
-              <a:srgbClr val="7030A0"/>
-            </a:solidFill>
-          </a:ln>
         </p:spPr>
         <p:style>
           <a:lnRef idx="2">
@@ -8961,97 +8927,26 @@
           <a:lstStyle/>
           <a:p>
             <a:pPr algn="ctr"/>
-            <a:endParaRPr lang="pt-BR"/>
-          </a:p>
-        </p:txBody>
-      </p:sp>
-      <p:sp>
-        <p:nvSpPr>
-          <p:cNvPr id="17" name="Retângulo 16"/>
+            <a:r>
+              <a:rPr lang="pt-BR" dirty="0" smtClean="0"/>
+              <a:t>inicio</a:t>
+            </a:r>
+            <a:endParaRPr lang="pt-BR" dirty="0"/>
+          </a:p>
+        </p:txBody>
+      </p:sp>
+      <p:sp>
+        <p:nvSpPr>
+          <p:cNvPr id="3" name="Elipse 2"/>
           <p:cNvSpPr/>
           <p:nvPr/>
         </p:nvSpPr>
         <p:spPr>
           <a:xfrm>
-            <a:off x="1037639" y="1817888"/>
-            <a:ext cx="9990085" cy="1508105"/>
-          </a:xfrm>
-          <a:prstGeom prst="rect">
-            <a:avLst/>
-          </a:prstGeom>
-        </p:spPr>
-        <p:txBody>
-          <a:bodyPr wrap="square">
-            <a:spAutoFit/>
-          </a:bodyPr>
-          <a:lstStyle/>
-          <a:p>
-            <a:pPr marL="109728" algn="ctr"/>
-            <a:r>
-              <a:rPr lang="pt-BR" sz="3200" dirty="0" smtClean="0">
-                <a:solidFill>
-                  <a:srgbClr val="FF0000"/>
-                </a:solidFill>
-                <a:latin typeface="Rockwell Condensed" panose="02060603050405020104" pitchFamily="18" charset="0"/>
-              </a:rPr>
-              <a:t>Fluxograma </a:t>
-            </a:r>
-            <a:r>
-              <a:rPr lang="pt-BR" sz="3200" dirty="0" smtClean="0">
-                <a:solidFill>
-                  <a:srgbClr val="FF0000"/>
-                </a:solidFill>
-                <a:latin typeface="Rockwell Condensed" panose="02060603050405020104" pitchFamily="18" charset="0"/>
-              </a:rPr>
-              <a:t>do código do </a:t>
-            </a:r>
-            <a:r>
-              <a:rPr lang="pt-BR" sz="3200" dirty="0" err="1" smtClean="0">
-                <a:solidFill>
-                  <a:srgbClr val="FF0000"/>
-                </a:solidFill>
-                <a:latin typeface="Rockwell Condensed" panose="02060603050405020104" pitchFamily="18" charset="0"/>
-              </a:rPr>
-              <a:t>NodeMCU</a:t>
-            </a:r>
-            <a:endParaRPr lang="pt-BR" sz="3200" dirty="0">
-              <a:solidFill>
-                <a:srgbClr val="FF0000"/>
-              </a:solidFill>
-              <a:latin typeface="Rockwell Condensed" panose="02060603050405020104" pitchFamily="18" charset="0"/>
-            </a:endParaRPr>
-          </a:p>
-          <a:p>
-            <a:pPr marL="109728" algn="ctr"/>
-            <a:endParaRPr lang="pt-BR" sz="3200" dirty="0">
-              <a:solidFill>
-                <a:srgbClr val="FF0000"/>
-              </a:solidFill>
-              <a:latin typeface="Rockwell Condensed" panose="02060603050405020104" pitchFamily="18" charset="0"/>
-            </a:endParaRPr>
-          </a:p>
-          <a:p>
-            <a:pPr marL="109728" indent="0" algn="ctr">
-              <a:buNone/>
-            </a:pPr>
-            <a:endParaRPr lang="pt-BR" sz="2800" dirty="0" smtClean="0">
-              <a:latin typeface="Rockwell Condensed" panose="02060603050405020104" pitchFamily="18" charset="0"/>
-            </a:endParaRPr>
-          </a:p>
-        </p:txBody>
-      </p:sp>
-      <p:sp>
-        <p:nvSpPr>
-          <p:cNvPr id="2" name="Retângulo 1"/>
-          <p:cNvSpPr/>
-          <p:nvPr/>
-        </p:nvSpPr>
-        <p:spPr>
-          <a:xfrm>
-            <a:off x="3088023" y="2643073"/>
-            <a:ext cx="757253" cy="322118"/>
-          </a:xfrm>
-          <a:prstGeom prst="rect">
+            <a:off x="5738167" y="3104557"/>
+            <a:ext cx="213655" cy="238991"/>
+          </a:xfrm>
+          <a:prstGeom prst="ellipse">
             <a:avLst/>
           </a:prstGeom>
         </p:spPr>
@@ -9078,24 +8973,60 @@
             <a:pPr algn="ctr"/>
             <a:r>
               <a:rPr lang="pt-BR" dirty="0" smtClean="0"/>
-              <a:t>inicio</a:t>
+              <a:t>A</a:t>
             </a:r>
             <a:endParaRPr lang="pt-BR" dirty="0"/>
           </a:p>
         </p:txBody>
       </p:sp>
-      <p:sp>
-        <p:nvSpPr>
-          <p:cNvPr id="3" name="Elipse 2"/>
+      <p:cxnSp>
+        <p:nvCxnSpPr>
+          <p:cNvPr id="6" name="Conector de seta reta 5"/>
+          <p:cNvCxnSpPr>
+            <a:stCxn id="2" idx="2"/>
+            <a:endCxn id="3" idx="0"/>
+          </p:cNvCxnSpPr>
+          <p:nvPr/>
+        </p:nvCxnSpPr>
+        <p:spPr>
+          <a:xfrm>
+            <a:off x="5842078" y="2855275"/>
+            <a:ext cx="2917" cy="249282"/>
+          </a:xfrm>
+          <a:prstGeom prst="straightConnector1">
+            <a:avLst/>
+          </a:prstGeom>
+          <a:ln>
+            <a:tailEnd type="arrow"/>
+          </a:ln>
+        </p:spPr>
+        <p:style>
+          <a:lnRef idx="1">
+            <a:schemeClr val="accent1"/>
+          </a:lnRef>
+          <a:fillRef idx="0">
+            <a:schemeClr val="accent1"/>
+          </a:fillRef>
+          <a:effectRef idx="0">
+            <a:schemeClr val="accent1"/>
+          </a:effectRef>
+          <a:fontRef idx="minor">
+            <a:schemeClr val="tx1"/>
+          </a:fontRef>
+        </p:style>
+      </p:cxnSp>
+      <p:sp>
+        <p:nvSpPr>
+          <p:cNvPr id="7" name="Losango 6"/>
           <p:cNvSpPr/>
           <p:nvPr/>
         </p:nvSpPr>
         <p:spPr>
           <a:xfrm>
-            <a:off x="3362739" y="3214473"/>
-            <a:ext cx="213655" cy="238991"/>
-          </a:xfrm>
-          <a:prstGeom prst="ellipse">
+            <a:off x="5181046" y="3563380"/>
+            <a:ext cx="1327897" cy="843045"/>
+          </a:xfrm>
+          <a:prstGeom prst="diamond">
             <a:avLst/>
           </a:prstGeom>
         </p:spPr>
@@ -9121,25 +9052,34 @@
           <a:p>
             <a:pPr algn="ctr"/>
             <a:r>
-              <a:rPr lang="pt-BR" dirty="0"/>
-              <a:t>A</a:t>
-            </a:r>
+              <a:rPr lang="pt-BR" dirty="0" smtClean="0"/>
+              <a:t>Tem </a:t>
+            </a:r>
+            <a:r>
+              <a:rPr lang="pt-BR" dirty="0" err="1" smtClean="0"/>
+              <a:t>tag</a:t>
+            </a:r>
+            <a:r>
+              <a:rPr lang="pt-BR" dirty="0" smtClean="0"/>
+              <a:t>?</a:t>
+            </a:r>
+            <a:endParaRPr lang="pt-BR" dirty="0"/>
           </a:p>
         </p:txBody>
       </p:sp>
       <p:cxnSp>
         <p:nvCxnSpPr>
-          <p:cNvPr id="6" name="Conector de seta reta 5"/>
+          <p:cNvPr id="14" name="Conector de seta reta 13"/>
           <p:cNvCxnSpPr>
-            <a:stCxn id="2" idx="2"/>
-            <a:endCxn id="3" idx="0"/>
+            <a:stCxn id="3" idx="4"/>
+            <a:endCxn id="7" idx="0"/>
           </p:cNvCxnSpPr>
           <p:nvPr/>
         </p:nvCxnSpPr>
         <p:spPr>
           <a:xfrm>
-            <a:off x="3466650" y="2965191"/>
-            <a:ext cx="2917" cy="249282"/>
+            <a:off x="5844995" y="3343548"/>
+            <a:ext cx="0" cy="219832"/>
           </a:xfrm>
           <a:prstGeom prst="straightConnector1">
             <a:avLst/>
@@ -9165,14 +9105,111 @@
       </p:cxnSp>
       <p:sp>
         <p:nvSpPr>
-          <p:cNvPr id="7" name="Losango 6"/>
+          <p:cNvPr id="21" name="CaixaDeTexto 20"/>
+          <p:cNvSpPr txBox="1"/>
+          <p:nvPr/>
+        </p:nvSpPr>
+        <p:spPr>
+          <a:xfrm>
+            <a:off x="6442730" y="3578155"/>
+            <a:ext cx="333746" cy="369332"/>
+          </a:xfrm>
+          <a:prstGeom prst="rect">
+            <a:avLst/>
+          </a:prstGeom>
+          <a:noFill/>
+        </p:spPr>
+        <p:txBody>
+          <a:bodyPr wrap="none" rtlCol="0">
+            <a:spAutoFit/>
+          </a:bodyPr>
+          <a:lstStyle/>
+          <a:p>
+            <a:r>
+              <a:rPr lang="pt-BR" dirty="0" smtClean="0"/>
+              <a:t>N</a:t>
+            </a:r>
+            <a:endParaRPr lang="pt-BR" dirty="0"/>
+          </a:p>
+        </p:txBody>
+      </p:sp>
+      <p:cxnSp>
+        <p:nvCxnSpPr>
+          <p:cNvPr id="23" name="Conector angulado 22"/>
+          <p:cNvCxnSpPr>
+            <a:stCxn id="7" idx="3"/>
+            <a:endCxn id="3" idx="6"/>
+          </p:cNvCxnSpPr>
+          <p:nvPr/>
+        </p:nvCxnSpPr>
+        <p:spPr>
+          <a:xfrm flipH="1" flipV="1">
+            <a:off x="5951822" y="3224053"/>
+            <a:ext cx="557121" cy="760850"/>
+          </a:xfrm>
+          <a:prstGeom prst="bentConnector3">
+            <a:avLst>
+              <a:gd name="adj1" fmla="val -41032"/>
+            </a:avLst>
+          </a:prstGeom>
+          <a:ln>
+            <a:tailEnd type="arrow"/>
+          </a:ln>
+        </p:spPr>
+        <p:style>
+          <a:lnRef idx="1">
+            <a:schemeClr val="accent1"/>
+          </a:lnRef>
+          <a:fillRef idx="0">
+            <a:schemeClr val="accent1"/>
+          </a:fillRef>
+          <a:effectRef idx="0">
+            <a:schemeClr val="accent1"/>
+          </a:effectRef>
+          <a:fontRef idx="minor">
+            <a:schemeClr val="tx1"/>
+          </a:fontRef>
+        </p:style>
+      </p:cxnSp>
+      <p:sp>
+        <p:nvSpPr>
+          <p:cNvPr id="27" name="CaixaDeTexto 26"/>
+          <p:cNvSpPr txBox="1"/>
+          <p:nvPr/>
+        </p:nvSpPr>
+        <p:spPr>
+          <a:xfrm>
+            <a:off x="6075472" y="4295059"/>
+            <a:ext cx="290464" cy="369332"/>
+          </a:xfrm>
+          <a:prstGeom prst="rect">
+            <a:avLst/>
+          </a:prstGeom>
+          <a:noFill/>
+        </p:spPr>
+        <p:txBody>
+          <a:bodyPr wrap="none" rtlCol="0">
+            <a:spAutoFit/>
+          </a:bodyPr>
+          <a:lstStyle/>
+          <a:p>
+            <a:r>
+              <a:rPr lang="pt-BR" dirty="0"/>
+              <a:t>S</a:t>
+            </a:r>
+          </a:p>
+        </p:txBody>
+      </p:sp>
+      <p:sp>
+        <p:nvSpPr>
+          <p:cNvPr id="28" name="Losango 27"/>
           <p:cNvSpPr/>
           <p:nvPr/>
         </p:nvSpPr>
         <p:spPr>
           <a:xfrm>
-            <a:off x="2805618" y="3673296"/>
-            <a:ext cx="1327897" cy="843045"/>
+            <a:off x="5094692" y="4589641"/>
+            <a:ext cx="1494770" cy="843045"/>
           </a:xfrm>
           <a:prstGeom prst="diamond">
             <a:avLst/>
@@ -9201,191 +9238,6 @@
             <a:pPr algn="ctr"/>
             <a:r>
               <a:rPr lang="pt-BR" dirty="0" smtClean="0"/>
-              <a:t>Tem </a:t>
-            </a:r>
-            <a:r>
-              <a:rPr lang="pt-BR" dirty="0" err="1" smtClean="0"/>
-              <a:t>tag</a:t>
-            </a:r>
-            <a:r>
-              <a:rPr lang="pt-BR" dirty="0" smtClean="0"/>
-              <a:t>?</a:t>
-            </a:r>
-            <a:endParaRPr lang="pt-BR" dirty="0"/>
-          </a:p>
-        </p:txBody>
-      </p:sp>
-      <p:cxnSp>
-        <p:nvCxnSpPr>
-          <p:cNvPr id="14" name="Conector de seta reta 13"/>
-          <p:cNvCxnSpPr>
-            <a:stCxn id="3" idx="4"/>
-            <a:endCxn id="7" idx="0"/>
-          </p:cNvCxnSpPr>
-          <p:nvPr/>
-        </p:nvCxnSpPr>
-        <p:spPr>
-          <a:xfrm>
-            <a:off x="3469567" y="3453464"/>
-            <a:ext cx="0" cy="219832"/>
-          </a:xfrm>
-          <a:prstGeom prst="straightConnector1">
-            <a:avLst/>
-          </a:prstGeom>
-          <a:ln>
-            <a:tailEnd type="arrow"/>
-          </a:ln>
-        </p:spPr>
-        <p:style>
-          <a:lnRef idx="1">
-            <a:schemeClr val="accent1"/>
-          </a:lnRef>
-          <a:fillRef idx="0">
-            <a:schemeClr val="accent1"/>
-          </a:fillRef>
-          <a:effectRef idx="0">
-            <a:schemeClr val="accent1"/>
-          </a:effectRef>
-          <a:fontRef idx="minor">
-            <a:schemeClr val="tx1"/>
-          </a:fontRef>
-        </p:style>
-      </p:cxnSp>
-      <p:sp>
-        <p:nvSpPr>
-          <p:cNvPr id="21" name="CaixaDeTexto 20"/>
-          <p:cNvSpPr txBox="1"/>
-          <p:nvPr/>
-        </p:nvSpPr>
-        <p:spPr>
-          <a:xfrm>
-            <a:off x="4133515" y="3688071"/>
-            <a:ext cx="333746" cy="369332"/>
-          </a:xfrm>
-          <a:prstGeom prst="rect">
-            <a:avLst/>
-          </a:prstGeom>
-          <a:noFill/>
-        </p:spPr>
-        <p:txBody>
-          <a:bodyPr wrap="none" rtlCol="0">
-            <a:spAutoFit/>
-          </a:bodyPr>
-          <a:lstStyle/>
-          <a:p>
-            <a:r>
-              <a:rPr lang="pt-BR" dirty="0" smtClean="0"/>
-              <a:t>N</a:t>
-            </a:r>
-            <a:endParaRPr lang="pt-BR" dirty="0"/>
-          </a:p>
-        </p:txBody>
-      </p:sp>
-      <p:cxnSp>
-        <p:nvCxnSpPr>
-          <p:cNvPr id="23" name="Conector angulado 22"/>
-          <p:cNvCxnSpPr>
-            <a:stCxn id="7" idx="3"/>
-            <a:endCxn id="3" idx="6"/>
-          </p:cNvCxnSpPr>
-          <p:nvPr/>
-        </p:nvCxnSpPr>
-        <p:spPr>
-          <a:xfrm flipH="1" flipV="1">
-            <a:off x="3576394" y="3333969"/>
-            <a:ext cx="557121" cy="760850"/>
-          </a:xfrm>
-          <a:prstGeom prst="bentConnector3">
-            <a:avLst>
-              <a:gd name="adj1" fmla="val -54088"/>
-            </a:avLst>
-          </a:prstGeom>
-          <a:ln>
-            <a:tailEnd type="arrow"/>
-          </a:ln>
-        </p:spPr>
-        <p:style>
-          <a:lnRef idx="1">
-            <a:schemeClr val="accent1"/>
-          </a:lnRef>
-          <a:fillRef idx="0">
-            <a:schemeClr val="accent1"/>
-          </a:fillRef>
-          <a:effectRef idx="0">
-            <a:schemeClr val="accent1"/>
-          </a:effectRef>
-          <a:fontRef idx="minor">
-            <a:schemeClr val="tx1"/>
-          </a:fontRef>
-        </p:style>
-      </p:cxnSp>
-      <p:sp>
-        <p:nvSpPr>
-          <p:cNvPr id="27" name="CaixaDeTexto 26"/>
-          <p:cNvSpPr txBox="1"/>
-          <p:nvPr/>
-        </p:nvSpPr>
-        <p:spPr>
-          <a:xfrm>
-            <a:off x="3700044" y="4404975"/>
-            <a:ext cx="290464" cy="369332"/>
-          </a:xfrm>
-          <a:prstGeom prst="rect">
-            <a:avLst/>
-          </a:prstGeom>
-          <a:noFill/>
-        </p:spPr>
-        <p:txBody>
-          <a:bodyPr wrap="none" rtlCol="0">
-            <a:spAutoFit/>
-          </a:bodyPr>
-          <a:lstStyle/>
-          <a:p>
-            <a:r>
-              <a:rPr lang="pt-BR" dirty="0"/>
-              <a:t>S</a:t>
-            </a:r>
-          </a:p>
-        </p:txBody>
-      </p:sp>
-      <p:sp>
-        <p:nvSpPr>
-          <p:cNvPr id="28" name="Losango 27"/>
-          <p:cNvSpPr/>
-          <p:nvPr/>
-        </p:nvSpPr>
-        <p:spPr>
-          <a:xfrm>
-            <a:off x="2719264" y="4699557"/>
-            <a:ext cx="1494770" cy="843045"/>
-          </a:xfrm>
-          <a:prstGeom prst="diamond">
-            <a:avLst/>
-          </a:prstGeom>
-        </p:spPr>
-        <p:style>
-          <a:lnRef idx="2">
-            <a:schemeClr val="accent1">
-              <a:shade val="50000"/>
-            </a:schemeClr>
-          </a:lnRef>
-          <a:fillRef idx="1">
-            <a:schemeClr val="accent1"/>
-          </a:fillRef>
-          <a:effectRef idx="0">
-            <a:schemeClr val="accent1"/>
-          </a:effectRef>
-          <a:fontRef idx="minor">
-            <a:schemeClr val="lt1"/>
-          </a:fontRef>
-        </p:style>
-        <p:txBody>
-          <a:bodyPr rtlCol="0" anchor="ctr"/>
-          <a:lstStyle/>
-          <a:p>
-            <a:pPr algn="ctr"/>
-            <a:r>
-              <a:rPr lang="pt-BR" dirty="0" smtClean="0"/>
               <a:t>Tem rede?</a:t>
             </a:r>
             <a:endParaRPr lang="pt-BR" dirty="0"/>
@@ -9402,7 +9254,7 @@
         </p:nvCxnSpPr>
         <p:spPr>
           <a:xfrm flipH="1">
-            <a:off x="3466649" y="4479725"/>
+            <a:off x="5842077" y="4369809"/>
             <a:ext cx="4818" cy="219832"/>
           </a:xfrm>
           <a:prstGeom prst="straightConnector1">
@@ -9430,13 +9282,16 @@
       <p:cxnSp>
         <p:nvCxnSpPr>
           <p:cNvPr id="30" name="Conector de seta reta 29"/>
-          <p:cNvCxnSpPr/>
+          <p:cNvCxnSpPr>
+            <a:stCxn id="28" idx="3"/>
+            <a:endCxn id="87" idx="1"/>
+          </p:cNvCxnSpPr>
           <p:nvPr/>
         </p:nvCxnSpPr>
         <p:spPr>
           <a:xfrm>
-            <a:off x="4133515" y="5121644"/>
-            <a:ext cx="333746" cy="0"/>
+            <a:off x="6589462" y="5011164"/>
+            <a:ext cx="1235714" cy="0"/>
           </a:xfrm>
           <a:prstGeom prst="straightConnector1">
             <a:avLst/>
@@ -9468,7 +9323,7 @@
         </p:nvSpPr>
         <p:spPr>
           <a:xfrm>
-            <a:off x="4237213" y="4699557"/>
+            <a:off x="6612641" y="4589641"/>
             <a:ext cx="333746" cy="369332"/>
           </a:xfrm>
           <a:prstGeom prst="rect">
@@ -9492,16 +9347,16 @@
       </p:sp>
       <p:sp>
         <p:nvSpPr>
-          <p:cNvPr id="38" name="Losango 37"/>
+          <p:cNvPr id="53" name="Retângulo 52"/>
           <p:cNvSpPr/>
           <p:nvPr/>
         </p:nvSpPr>
         <p:spPr>
           <a:xfrm>
-            <a:off x="4467260" y="4709350"/>
-            <a:ext cx="1528295" cy="843045"/>
-          </a:xfrm>
-          <a:prstGeom prst="diamond">
+            <a:off x="4444325" y="5576034"/>
+            <a:ext cx="2805139" cy="711478"/>
+          </a:xfrm>
+          <a:prstGeom prst="rect">
             <a:avLst/>
           </a:prstGeom>
         </p:spPr>
@@ -9528,30 +9383,95 @@
             <a:pPr algn="ctr"/>
             <a:r>
               <a:rPr lang="pt-BR" dirty="0" smtClean="0"/>
-              <a:t>É o </a:t>
+              <a:t>Envia a </a:t>
             </a:r>
             <a:r>
               <a:rPr lang="pt-BR" dirty="0" err="1" smtClean="0"/>
-              <a:t>Adm</a:t>
+              <a:t>tag</a:t>
             </a:r>
             <a:r>
               <a:rPr lang="pt-BR" dirty="0" smtClean="0"/>
-              <a:t>?</a:t>
+              <a:t> para o servidor.</a:t>
             </a:r>
             <a:endParaRPr lang="pt-BR" dirty="0"/>
           </a:p>
         </p:txBody>
       </p:sp>
-      <p:sp>
-        <p:nvSpPr>
-          <p:cNvPr id="5123" name="Retângulo 5122"/>
+      <p:cxnSp>
+        <p:nvCxnSpPr>
+          <p:cNvPr id="67" name="Conector angulado 66"/>
+          <p:cNvCxnSpPr>
+            <a:stCxn id="130" idx="0"/>
+            <a:endCxn id="3" idx="2"/>
+          </p:cNvCxnSpPr>
+          <p:nvPr/>
+        </p:nvCxnSpPr>
+        <p:spPr>
+          <a:xfrm rot="5400000" flipH="1" flipV="1">
+            <a:off x="4792556" y="2525573"/>
+            <a:ext cx="247131" cy="1644092"/>
+          </a:xfrm>
+          <a:prstGeom prst="bentConnector2">
+            <a:avLst/>
+          </a:prstGeom>
+          <a:ln>
+            <a:tailEnd type="arrow"/>
+          </a:ln>
+        </p:spPr>
+        <p:style>
+          <a:lnRef idx="1">
+            <a:schemeClr val="accent1"/>
+          </a:lnRef>
+          <a:fillRef idx="0">
+            <a:schemeClr val="accent1"/>
+          </a:fillRef>
+          <a:effectRef idx="0">
+            <a:schemeClr val="accent1"/>
+          </a:effectRef>
+          <a:fontRef idx="minor">
+            <a:schemeClr val="tx1"/>
+          </a:fontRef>
+        </p:style>
+      </p:cxnSp>
+      <p:sp>
+        <p:nvSpPr>
+          <p:cNvPr id="83" name="CaixaDeTexto 82"/>
+          <p:cNvSpPr txBox="1"/>
+          <p:nvPr/>
+        </p:nvSpPr>
+        <p:spPr>
+          <a:xfrm>
+            <a:off x="6113335" y="5244454"/>
+            <a:ext cx="290464" cy="369332"/>
+          </a:xfrm>
+          <a:prstGeom prst="rect">
+            <a:avLst/>
+          </a:prstGeom>
+          <a:noFill/>
+        </p:spPr>
+        <p:txBody>
+          <a:bodyPr wrap="none" rtlCol="0">
+            <a:spAutoFit/>
+          </a:bodyPr>
+          <a:lstStyle/>
+          <a:p>
+            <a:r>
+              <a:rPr lang="pt-BR" dirty="0"/>
+              <a:t>S</a:t>
+            </a:r>
+          </a:p>
+        </p:txBody>
+      </p:sp>
+      <p:sp>
+        <p:nvSpPr>
+          <p:cNvPr id="87" name="Retângulo 86"/>
           <p:cNvSpPr/>
           <p:nvPr/>
         </p:nvSpPr>
         <p:spPr>
           <a:xfrm>
-            <a:off x="4404087" y="5829300"/>
-            <a:ext cx="1687618" cy="290945"/>
+            <a:off x="7825176" y="4648098"/>
+            <a:ext cx="1687618" cy="726132"/>
           </a:xfrm>
           <a:prstGeom prst="rect">
             <a:avLst/>
@@ -9580,7 +9500,67 @@
             <a:pPr algn="ctr"/>
             <a:r>
               <a:rPr lang="pt-BR" dirty="0" smtClean="0"/>
-              <a:t>Modo PGM</a:t>
+              <a:t>Erro ao enviar a </a:t>
+            </a:r>
+            <a:r>
+              <a:rPr lang="pt-BR" dirty="0" err="1" smtClean="0"/>
+              <a:t>tag</a:t>
+            </a:r>
+            <a:r>
+              <a:rPr lang="pt-BR" dirty="0" smtClean="0"/>
+              <a:t> para o servidor</a:t>
+            </a:r>
+            <a:endParaRPr lang="pt-BR" dirty="0"/>
+          </a:p>
+        </p:txBody>
+      </p:sp>
+      <p:sp>
+        <p:nvSpPr>
+          <p:cNvPr id="96" name="Retângulo 95"/>
+          <p:cNvSpPr/>
+          <p:nvPr/>
+        </p:nvSpPr>
+        <p:spPr>
+          <a:xfrm>
+            <a:off x="7825176" y="3643325"/>
+            <a:ext cx="1687618" cy="545511"/>
+          </a:xfrm>
+          <a:prstGeom prst="rect">
+            <a:avLst/>
+          </a:prstGeom>
+        </p:spPr>
+        <p:style>
+          <a:lnRef idx="2">
+            <a:schemeClr val="accent1">
+              <a:shade val="50000"/>
+            </a:schemeClr>
+          </a:lnRef>
+          <a:fillRef idx="1">
+            <a:schemeClr val="accent1"/>
+          </a:fillRef>
+          <a:effectRef idx="0">
+            <a:schemeClr val="accent1"/>
+          </a:effectRef>
+          <a:fontRef idx="minor">
+            <a:schemeClr val="lt1"/>
+          </a:fontRef>
+        </p:style>
+        <p:txBody>
+          <a:bodyPr rtlCol="0" anchor="ctr"/>
+          <a:lstStyle/>
+          <a:p>
+            <a:pPr algn="ctr"/>
+            <a:r>
+              <a:rPr lang="pt-BR" dirty="0" smtClean="0"/>
+              <a:t>Acende o </a:t>
+            </a:r>
+            <a:r>
+              <a:rPr lang="pt-BR" dirty="0" err="1" smtClean="0"/>
+              <a:t>led</a:t>
+            </a:r>
+            <a:r>
+              <a:rPr lang="pt-BR" dirty="0" smtClean="0"/>
+              <a:t> vermelho</a:t>
             </a:r>
             <a:endParaRPr lang="pt-BR" dirty="0"/>
           </a:p>
@@ -9588,20 +9568,363 @@
       </p:sp>
       <p:cxnSp>
         <p:nvCxnSpPr>
-          <p:cNvPr id="5125" name="Conector de seta reta 5124"/>
+          <p:cNvPr id="31" name="Conector de seta reta 30"/>
           <p:cNvCxnSpPr>
-            <a:stCxn id="38" idx="2"/>
-            <a:endCxn id="5123" idx="0"/>
+            <a:stCxn id="87" idx="0"/>
+            <a:endCxn id="96" idx="2"/>
           </p:cNvCxnSpPr>
           <p:nvPr/>
         </p:nvCxnSpPr>
         <p:spPr>
-          <a:xfrm>
-            <a:off x="5231408" y="5552395"/>
-            <a:ext cx="16488" cy="276905"/>
+          <a:xfrm flipV="1">
+            <a:off x="8668985" y="4188836"/>
+            <a:ext cx="0" cy="459262"/>
           </a:xfrm>
           <a:prstGeom prst="straightConnector1">
             <a:avLst/>
+          </a:prstGeom>
+          <a:ln>
+            <a:tailEnd type="arrow"/>
+          </a:ln>
+        </p:spPr>
+        <p:style>
+          <a:lnRef idx="1">
+            <a:schemeClr val="accent1"/>
+          </a:lnRef>
+          <a:fillRef idx="0">
+            <a:schemeClr val="accent1"/>
+          </a:fillRef>
+          <a:effectRef idx="0">
+            <a:schemeClr val="accent1"/>
+          </a:effectRef>
+          <a:fontRef idx="minor">
+            <a:schemeClr val="tx1"/>
+          </a:fontRef>
+        </p:style>
+      </p:cxnSp>
+      <p:sp>
+        <p:nvSpPr>
+          <p:cNvPr id="111" name="Elipse 110"/>
+          <p:cNvSpPr/>
+          <p:nvPr/>
+        </p:nvSpPr>
+        <p:spPr>
+          <a:xfrm>
+            <a:off x="8562157" y="3091604"/>
+            <a:ext cx="213655" cy="238991"/>
+          </a:xfrm>
+          <a:prstGeom prst="ellipse">
+            <a:avLst/>
+          </a:prstGeom>
+        </p:spPr>
+        <p:style>
+          <a:lnRef idx="2">
+            <a:schemeClr val="accent1">
+              <a:shade val="50000"/>
+            </a:schemeClr>
+          </a:lnRef>
+          <a:fillRef idx="1">
+            <a:schemeClr val="accent1"/>
+          </a:fillRef>
+          <a:effectRef idx="0">
+            <a:schemeClr val="accent1"/>
+          </a:effectRef>
+          <a:fontRef idx="minor">
+            <a:schemeClr val="lt1"/>
+          </a:fontRef>
+        </p:style>
+        <p:txBody>
+          <a:bodyPr rtlCol="0" anchor="ctr"/>
+          <a:lstStyle/>
+          <a:p>
+            <a:pPr algn="ctr"/>
+            <a:r>
+              <a:rPr lang="pt-BR" dirty="0" smtClean="0"/>
+              <a:t>A</a:t>
+            </a:r>
+            <a:endParaRPr lang="pt-BR" dirty="0"/>
+          </a:p>
+        </p:txBody>
+      </p:sp>
+      <p:cxnSp>
+        <p:nvCxnSpPr>
+          <p:cNvPr id="44" name="Conector de seta reta 43"/>
+          <p:cNvCxnSpPr>
+            <a:stCxn id="96" idx="0"/>
+            <a:endCxn id="111" idx="4"/>
+          </p:cNvCxnSpPr>
+          <p:nvPr/>
+        </p:nvCxnSpPr>
+        <p:spPr>
+          <a:xfrm flipV="1">
+            <a:off x="8668985" y="3330595"/>
+            <a:ext cx="0" cy="312730"/>
+          </a:xfrm>
+          <a:prstGeom prst="straightConnector1">
+            <a:avLst/>
+          </a:prstGeom>
+          <a:ln>
+            <a:tailEnd type="arrow"/>
+          </a:ln>
+        </p:spPr>
+        <p:style>
+          <a:lnRef idx="1">
+            <a:schemeClr val="accent1"/>
+          </a:lnRef>
+          <a:fillRef idx="0">
+            <a:schemeClr val="accent1"/>
+          </a:fillRef>
+          <a:effectRef idx="0">
+            <a:schemeClr val="accent1"/>
+          </a:effectRef>
+          <a:fontRef idx="minor">
+            <a:schemeClr val="tx1"/>
+          </a:fontRef>
+        </p:style>
+      </p:cxnSp>
+      <p:sp>
+        <p:nvSpPr>
+          <p:cNvPr id="130" name="Retângulo 129"/>
+          <p:cNvSpPr/>
+          <p:nvPr/>
+        </p:nvSpPr>
+        <p:spPr>
+          <a:xfrm>
+            <a:off x="3250266" y="3471184"/>
+            <a:ext cx="1687618" cy="545511"/>
+          </a:xfrm>
+          <a:prstGeom prst="rect">
+            <a:avLst/>
+          </a:prstGeom>
+        </p:spPr>
+        <p:style>
+          <a:lnRef idx="2">
+            <a:schemeClr val="accent1">
+              <a:shade val="50000"/>
+            </a:schemeClr>
+          </a:lnRef>
+          <a:fillRef idx="1">
+            <a:schemeClr val="accent1"/>
+          </a:fillRef>
+          <a:effectRef idx="0">
+            <a:schemeClr val="accent1"/>
+          </a:effectRef>
+          <a:fontRef idx="minor">
+            <a:schemeClr val="lt1"/>
+          </a:fontRef>
+        </p:style>
+        <p:txBody>
+          <a:bodyPr rtlCol="0" anchor="ctr"/>
+          <a:lstStyle/>
+          <a:p>
+            <a:pPr algn="ctr"/>
+            <a:r>
+              <a:rPr lang="pt-BR" dirty="0" smtClean="0"/>
+              <a:t>Acende o </a:t>
+            </a:r>
+            <a:r>
+              <a:rPr lang="pt-BR" dirty="0" err="1" smtClean="0"/>
+              <a:t>led</a:t>
+            </a:r>
+            <a:r>
+              <a:rPr lang="pt-BR" dirty="0" smtClean="0"/>
+              <a:t> verde</a:t>
+            </a:r>
+            <a:endParaRPr lang="pt-BR" dirty="0"/>
+          </a:p>
+        </p:txBody>
+      </p:sp>
+      <p:cxnSp>
+        <p:nvCxnSpPr>
+          <p:cNvPr id="101" name="Conector angulado 100"/>
+          <p:cNvCxnSpPr>
+            <a:stCxn id="28" idx="2"/>
+            <a:endCxn id="53" idx="0"/>
+          </p:cNvCxnSpPr>
+          <p:nvPr/>
+        </p:nvCxnSpPr>
+        <p:spPr>
+          <a:xfrm rot="16200000" flipH="1">
+            <a:off x="5772812" y="5501951"/>
+            <a:ext cx="143348" cy="4818"/>
+          </a:xfrm>
+          <a:prstGeom prst="bentConnector3">
+            <a:avLst/>
+          </a:prstGeom>
+          <a:ln>
+            <a:tailEnd type="arrow"/>
+          </a:ln>
+        </p:spPr>
+        <p:style>
+          <a:lnRef idx="1">
+            <a:schemeClr val="accent1"/>
+          </a:lnRef>
+          <a:fillRef idx="0">
+            <a:schemeClr val="accent1"/>
+          </a:fillRef>
+          <a:effectRef idx="0">
+            <a:schemeClr val="accent1"/>
+          </a:effectRef>
+          <a:fontRef idx="minor">
+            <a:schemeClr val="tx1"/>
+          </a:fontRef>
+        </p:style>
+      </p:cxnSp>
+      <p:sp>
+        <p:nvSpPr>
+          <p:cNvPr id="142" name="Losango 141"/>
+          <p:cNvSpPr/>
+          <p:nvPr/>
+        </p:nvSpPr>
+        <p:spPr>
+          <a:xfrm>
+            <a:off x="968558" y="4628199"/>
+            <a:ext cx="3356263" cy="985587"/>
+          </a:xfrm>
+          <a:prstGeom prst="diamond">
+            <a:avLst/>
+          </a:prstGeom>
+        </p:spPr>
+        <p:style>
+          <a:lnRef idx="2">
+            <a:schemeClr val="accent1">
+              <a:shade val="50000"/>
+            </a:schemeClr>
+          </a:lnRef>
+          <a:fillRef idx="1">
+            <a:schemeClr val="accent1"/>
+          </a:fillRef>
+          <a:effectRef idx="0">
+            <a:schemeClr val="accent1"/>
+          </a:effectRef>
+          <a:fontRef idx="minor">
+            <a:schemeClr val="lt1"/>
+          </a:fontRef>
+        </p:style>
+        <p:txBody>
+          <a:bodyPr rtlCol="0" anchor="ctr"/>
+          <a:lstStyle/>
+          <a:p>
+            <a:pPr algn="ctr"/>
+            <a:r>
+              <a:rPr lang="pt-BR" dirty="0" smtClean="0"/>
+              <a:t>Inseriu no banco de dados</a:t>
+            </a:r>
+            <a:r>
+              <a:rPr lang="pt-BR" dirty="0" smtClean="0"/>
+              <a:t>?</a:t>
+            </a:r>
+            <a:endParaRPr lang="pt-BR" dirty="0"/>
+          </a:p>
+        </p:txBody>
+      </p:sp>
+      <p:cxnSp>
+        <p:nvCxnSpPr>
+          <p:cNvPr id="104" name="Conector angulado 103"/>
+          <p:cNvCxnSpPr>
+            <a:stCxn id="53" idx="1"/>
+            <a:endCxn id="142" idx="2"/>
+          </p:cNvCxnSpPr>
+          <p:nvPr/>
+        </p:nvCxnSpPr>
+        <p:spPr>
+          <a:xfrm rot="10800000">
+            <a:off x="2646691" y="5613787"/>
+            <a:ext cx="1797635" cy="317987"/>
+          </a:xfrm>
+          <a:prstGeom prst="bentConnector2">
+            <a:avLst/>
+          </a:prstGeom>
+          <a:ln>
+            <a:tailEnd type="arrow"/>
+          </a:ln>
+        </p:spPr>
+        <p:style>
+          <a:lnRef idx="1">
+            <a:schemeClr val="accent1"/>
+          </a:lnRef>
+          <a:fillRef idx="0">
+            <a:schemeClr val="accent1"/>
+          </a:fillRef>
+          <a:effectRef idx="0">
+            <a:schemeClr val="accent1"/>
+          </a:effectRef>
+          <a:fontRef idx="minor">
+            <a:schemeClr val="tx1"/>
+          </a:fontRef>
+        </p:style>
+      </p:cxnSp>
+      <p:sp>
+        <p:nvSpPr>
+          <p:cNvPr id="150" name="Retângulo 149"/>
+          <p:cNvSpPr/>
+          <p:nvPr/>
+        </p:nvSpPr>
+        <p:spPr>
+          <a:xfrm>
+            <a:off x="735886" y="3463100"/>
+            <a:ext cx="1687618" cy="545511"/>
+          </a:xfrm>
+          <a:prstGeom prst="rect">
+            <a:avLst/>
+          </a:prstGeom>
+        </p:spPr>
+        <p:style>
+          <a:lnRef idx="2">
+            <a:schemeClr val="accent1">
+              <a:shade val="50000"/>
+            </a:schemeClr>
+          </a:lnRef>
+          <a:fillRef idx="1">
+            <a:schemeClr val="accent1"/>
+          </a:fillRef>
+          <a:effectRef idx="0">
+            <a:schemeClr val="accent1"/>
+          </a:effectRef>
+          <a:fontRef idx="minor">
+            <a:schemeClr val="lt1"/>
+          </a:fontRef>
+        </p:style>
+        <p:txBody>
+          <a:bodyPr rtlCol="0" anchor="ctr"/>
+          <a:lstStyle/>
+          <a:p>
+            <a:pPr algn="ctr"/>
+            <a:r>
+              <a:rPr lang="pt-BR" dirty="0" smtClean="0"/>
+              <a:t>Acende o </a:t>
+            </a:r>
+            <a:r>
+              <a:rPr lang="pt-BR" dirty="0" err="1" smtClean="0"/>
+              <a:t>led</a:t>
+            </a:r>
+            <a:r>
+              <a:rPr lang="pt-BR" dirty="0" smtClean="0"/>
+              <a:t> vermelho</a:t>
+            </a:r>
+            <a:endParaRPr lang="pt-BR" dirty="0"/>
+          </a:p>
+        </p:txBody>
+      </p:sp>
+      <p:cxnSp>
+        <p:nvCxnSpPr>
+          <p:cNvPr id="116" name="Conector angulado 115"/>
+          <p:cNvCxnSpPr>
+            <a:stCxn id="142" idx="3"/>
+            <a:endCxn id="130" idx="2"/>
+          </p:cNvCxnSpPr>
+          <p:nvPr/>
+        </p:nvCxnSpPr>
+        <p:spPr>
+          <a:xfrm flipH="1" flipV="1">
+            <a:off x="4094075" y="4016695"/>
+            <a:ext cx="230746" cy="1104298"/>
+          </a:xfrm>
+          <a:prstGeom prst="bentConnector4">
+            <a:avLst>
+              <a:gd name="adj1" fmla="val -99070"/>
+              <a:gd name="adj2" fmla="val 72313"/>
+            </a:avLst>
           </a:prstGeom>
           <a:ln>
             <a:tailEnd type="arrow"/>
@@ -9624,19 +9947,23 @@
       </p:cxnSp>
       <p:cxnSp>
         <p:nvCxnSpPr>
-          <p:cNvPr id="5128" name="Conector angulado 5127"/>
+          <p:cNvPr id="120" name="Conector angulado 119"/>
           <p:cNvCxnSpPr>
-            <a:stCxn id="38" idx="3"/>
+            <a:stCxn id="142" idx="1"/>
+            <a:endCxn id="150" idx="2"/>
           </p:cNvCxnSpPr>
           <p:nvPr/>
         </p:nvCxnSpPr>
         <p:spPr>
-          <a:xfrm flipV="1">
-            <a:off x="5995555" y="4589641"/>
-            <a:ext cx="197427" cy="541232"/>
-          </a:xfrm>
-          <a:prstGeom prst="bentConnector2">
-            <a:avLst/>
+          <a:xfrm rot="10800000" flipH="1">
+            <a:off x="968557" y="4008611"/>
+            <a:ext cx="611137" cy="1112382"/>
+          </a:xfrm>
+          <a:prstGeom prst="bentConnector4">
+            <a:avLst>
+              <a:gd name="adj1" fmla="val -37406"/>
+              <a:gd name="adj2" fmla="val 72150"/>
+            </a:avLst>
           </a:prstGeom>
           <a:ln>
             <a:tailEnd type="arrow"/>
@@ -9659,42 +9986,13 @@
       </p:cxnSp>
       <p:sp>
         <p:nvSpPr>
-          <p:cNvPr id="45" name="CaixaDeTexto 44"/>
-          <p:cNvSpPr txBox="1"/>
-          <p:nvPr/>
-        </p:nvSpPr>
-        <p:spPr>
-          <a:xfrm>
-            <a:off x="5390298" y="5459968"/>
-            <a:ext cx="290464" cy="369332"/>
-          </a:xfrm>
-          <a:prstGeom prst="rect">
-            <a:avLst/>
-          </a:prstGeom>
-          <a:noFill/>
-        </p:spPr>
-        <p:txBody>
-          <a:bodyPr wrap="none" rtlCol="0">
-            <a:spAutoFit/>
-          </a:bodyPr>
-          <a:lstStyle/>
-          <a:p>
-            <a:r>
-              <a:rPr lang="pt-BR" dirty="0"/>
-              <a:t>S</a:t>
-            </a:r>
-          </a:p>
-        </p:txBody>
-      </p:sp>
-      <p:sp>
-        <p:nvSpPr>
-          <p:cNvPr id="46" name="Elipse 45"/>
+          <p:cNvPr id="156" name="Elipse 155"/>
           <p:cNvSpPr/>
           <p:nvPr/>
         </p:nvSpPr>
         <p:spPr>
           <a:xfrm>
-            <a:off x="6383030" y="5855276"/>
+            <a:off x="1472867" y="2974978"/>
             <a:ext cx="213655" cy="238991"/>
           </a:xfrm>
           <a:prstGeom prst="ellipse">
@@ -9722,23 +10020,27 @@
           <a:lstStyle/>
           <a:p>
             <a:pPr algn="ctr"/>
+            <a:r>
+              <a:rPr lang="pt-BR" dirty="0" smtClean="0"/>
+              <a:t>A</a:t>
+            </a:r>
             <a:endParaRPr lang="pt-BR" dirty="0"/>
           </a:p>
         </p:txBody>
       </p:sp>
       <p:cxnSp>
         <p:nvCxnSpPr>
-          <p:cNvPr id="5130" name="Conector de seta reta 5129"/>
+          <p:cNvPr id="123" name="Conector de seta reta 122"/>
           <p:cNvCxnSpPr>
-            <a:stCxn id="5123" idx="3"/>
-            <a:endCxn id="46" idx="2"/>
+            <a:stCxn id="150" idx="0"/>
+            <a:endCxn id="156" idx="4"/>
           </p:cNvCxnSpPr>
           <p:nvPr/>
         </p:nvCxnSpPr>
         <p:spPr>
           <a:xfrm flipV="1">
-            <a:off x="6091705" y="5974772"/>
-            <a:ext cx="291325" cy="1"/>
+            <a:off x="1579695" y="3213969"/>
+            <a:ext cx="0" cy="249131"/>
           </a:xfrm>
           <a:prstGeom prst="straightConnector1">
             <a:avLst/>
@@ -9764,14 +10066,14 @@
       </p:cxnSp>
       <p:sp>
         <p:nvSpPr>
-          <p:cNvPr id="49" name="CaixaDeTexto 48"/>
+          <p:cNvPr id="157" name="CaixaDeTexto 156"/>
           <p:cNvSpPr txBox="1"/>
           <p:nvPr/>
         </p:nvSpPr>
         <p:spPr>
           <a:xfrm>
-            <a:off x="5760522" y="4699557"/>
-            <a:ext cx="333746" cy="369332"/>
+            <a:off x="4153861" y="4628199"/>
+            <a:ext cx="290464" cy="369332"/>
           </a:xfrm>
           <a:prstGeom prst="rect">
             <a:avLst/>
@@ -9785,353 +10087,22 @@
           <a:lstStyle/>
           <a:p>
             <a:r>
-              <a:rPr lang="pt-BR" dirty="0" smtClean="0"/>
-              <a:t>N</a:t>
-            </a:r>
-            <a:endParaRPr lang="pt-BR" dirty="0"/>
-          </a:p>
-        </p:txBody>
-      </p:sp>
-      <p:cxnSp>
-        <p:nvCxnSpPr>
-          <p:cNvPr id="5132" name="Conector angulado 5131"/>
-          <p:cNvCxnSpPr>
-            <a:stCxn id="28" idx="2"/>
-          </p:cNvCxnSpPr>
-          <p:nvPr/>
-        </p:nvCxnSpPr>
-        <p:spPr>
-          <a:xfrm rot="16200000" flipH="1">
-            <a:off x="3325709" y="5683542"/>
-            <a:ext cx="286698" cy="4818"/>
-          </a:xfrm>
-          <a:prstGeom prst="bentConnector3">
-            <a:avLst/>
-          </a:prstGeom>
-          <a:ln>
-            <a:tailEnd type="arrow"/>
-          </a:ln>
-        </p:spPr>
-        <p:style>
-          <a:lnRef idx="1">
-            <a:schemeClr val="accent1"/>
-          </a:lnRef>
-          <a:fillRef idx="0">
-            <a:schemeClr val="accent1"/>
-          </a:fillRef>
-          <a:effectRef idx="0">
-            <a:schemeClr val="accent1"/>
-          </a:effectRef>
-          <a:fontRef idx="minor">
-            <a:schemeClr val="tx1"/>
-          </a:fontRef>
-        </p:style>
-      </p:cxnSp>
-      <p:sp>
-        <p:nvSpPr>
-          <p:cNvPr id="53" name="Retângulo 52"/>
-          <p:cNvSpPr/>
-          <p:nvPr/>
-        </p:nvSpPr>
-        <p:spPr>
-          <a:xfrm>
-            <a:off x="2627658" y="5829298"/>
-            <a:ext cx="1687618" cy="290945"/>
-          </a:xfrm>
-          <a:prstGeom prst="rect">
-            <a:avLst/>
-          </a:prstGeom>
-        </p:spPr>
-        <p:style>
-          <a:lnRef idx="2">
-            <a:schemeClr val="accent1">
-              <a:shade val="50000"/>
-            </a:schemeClr>
-          </a:lnRef>
-          <a:fillRef idx="1">
-            <a:schemeClr val="accent1"/>
-          </a:fillRef>
-          <a:effectRef idx="0">
-            <a:schemeClr val="accent1"/>
-          </a:effectRef>
-          <a:fontRef idx="minor">
-            <a:schemeClr val="lt1"/>
-          </a:fontRef>
-        </p:style>
-        <p:txBody>
-          <a:bodyPr rtlCol="0" anchor="ctr"/>
-          <a:lstStyle/>
-          <a:p>
-            <a:pPr algn="ctr"/>
-            <a:r>
-              <a:rPr lang="pt-BR" dirty="0" smtClean="0"/>
-              <a:t>Consulta banco</a:t>
-            </a:r>
-            <a:endParaRPr lang="pt-BR" dirty="0"/>
-          </a:p>
-        </p:txBody>
-      </p:sp>
-      <p:cxnSp>
-        <p:nvCxnSpPr>
-          <p:cNvPr id="5136" name="Conector angulado 5135"/>
-          <p:cNvCxnSpPr>
-            <a:stCxn id="53" idx="1"/>
-            <a:endCxn id="60" idx="3"/>
-          </p:cNvCxnSpPr>
-          <p:nvPr/>
-        </p:nvCxnSpPr>
-        <p:spPr>
-          <a:xfrm rot="10800000">
-            <a:off x="2344550" y="5721281"/>
-            <a:ext cx="283108" cy="253490"/>
-          </a:xfrm>
-          <a:prstGeom prst="bentConnector3">
-            <a:avLst>
-              <a:gd name="adj1" fmla="val 50000"/>
-            </a:avLst>
-          </a:prstGeom>
-          <a:ln>
-            <a:tailEnd type="arrow"/>
-          </a:ln>
-        </p:spPr>
-        <p:style>
-          <a:lnRef idx="1">
-            <a:schemeClr val="accent1"/>
-          </a:lnRef>
-          <a:fillRef idx="0">
-            <a:schemeClr val="accent1"/>
-          </a:fillRef>
-          <a:effectRef idx="0">
-            <a:schemeClr val="accent1"/>
-          </a:effectRef>
-          <a:fontRef idx="minor">
-            <a:schemeClr val="tx1"/>
-          </a:fontRef>
-        </p:style>
-      </p:cxnSp>
-      <p:sp>
-        <p:nvSpPr>
-          <p:cNvPr id="60" name="Losango 59"/>
-          <p:cNvSpPr/>
-          <p:nvPr/>
-        </p:nvSpPr>
-        <p:spPr>
-          <a:xfrm>
-            <a:off x="849780" y="5249580"/>
-            <a:ext cx="1494770" cy="943402"/>
-          </a:xfrm>
-          <a:prstGeom prst="diamond">
-            <a:avLst/>
-          </a:prstGeom>
-        </p:spPr>
-        <p:style>
-          <a:lnRef idx="2">
-            <a:schemeClr val="accent1">
-              <a:shade val="50000"/>
-            </a:schemeClr>
-          </a:lnRef>
-          <a:fillRef idx="1">
-            <a:schemeClr val="accent1"/>
-          </a:fillRef>
-          <a:effectRef idx="0">
-            <a:schemeClr val="accent1"/>
-          </a:effectRef>
-          <a:fontRef idx="minor">
-            <a:schemeClr val="lt1"/>
-          </a:fontRef>
-        </p:style>
-        <p:txBody>
-          <a:bodyPr rtlCol="0" anchor="ctr"/>
-          <a:lstStyle/>
-          <a:p>
-            <a:pPr algn="ctr"/>
-            <a:r>
-              <a:rPr lang="pt-BR" dirty="0" err="1" smtClean="0"/>
-              <a:t>Tag</a:t>
-            </a:r>
-            <a:r>
-              <a:rPr lang="pt-BR" dirty="0" smtClean="0"/>
-              <a:t> habilitada?</a:t>
-            </a:r>
-            <a:endParaRPr lang="pt-BR" dirty="0"/>
-          </a:p>
-        </p:txBody>
-      </p:sp>
-      <p:cxnSp>
-        <p:nvCxnSpPr>
-          <p:cNvPr id="40" name="Conector angulado 39"/>
-          <p:cNvCxnSpPr>
-            <a:stCxn id="60" idx="0"/>
-            <a:endCxn id="81" idx="2"/>
-          </p:cNvCxnSpPr>
-          <p:nvPr/>
-        </p:nvCxnSpPr>
-        <p:spPr>
-          <a:xfrm rot="5400000" flipH="1" flipV="1">
-            <a:off x="1772568" y="4559711"/>
-            <a:ext cx="514467" cy="865273"/>
-          </a:xfrm>
-          <a:prstGeom prst="bentConnector3">
-            <a:avLst>
-              <a:gd name="adj1" fmla="val 50000"/>
-            </a:avLst>
-          </a:prstGeom>
-          <a:ln>
-            <a:tailEnd type="arrow"/>
-          </a:ln>
-        </p:spPr>
-        <p:style>
-          <a:lnRef idx="1">
-            <a:schemeClr val="accent1"/>
-          </a:lnRef>
-          <a:fillRef idx="0">
-            <a:schemeClr val="accent1"/>
-          </a:fillRef>
-          <a:effectRef idx="0">
-            <a:schemeClr val="accent1"/>
-          </a:effectRef>
-          <a:fontRef idx="minor">
-            <a:schemeClr val="tx1"/>
-          </a:fontRef>
-        </p:style>
-      </p:cxnSp>
-      <p:sp>
-        <p:nvSpPr>
-          <p:cNvPr id="81" name="Retângulo 80"/>
-          <p:cNvSpPr/>
-          <p:nvPr/>
-        </p:nvSpPr>
-        <p:spPr>
-          <a:xfrm>
-            <a:off x="1995055" y="4444168"/>
-            <a:ext cx="934765" cy="290945"/>
-          </a:xfrm>
-          <a:prstGeom prst="rect">
-            <a:avLst/>
-          </a:prstGeom>
-        </p:spPr>
-        <p:style>
-          <a:lnRef idx="2">
-            <a:schemeClr val="accent1">
-              <a:shade val="50000"/>
-            </a:schemeClr>
-          </a:lnRef>
-          <a:fillRef idx="1">
-            <a:schemeClr val="accent1"/>
-          </a:fillRef>
-          <a:effectRef idx="0">
-            <a:schemeClr val="accent1"/>
-          </a:effectRef>
-          <a:fontRef idx="minor">
-            <a:schemeClr val="lt1"/>
-          </a:fontRef>
-        </p:style>
-        <p:txBody>
-          <a:bodyPr rtlCol="0" anchor="ctr"/>
-          <a:lstStyle/>
-          <a:p>
-            <a:pPr algn="ctr"/>
-            <a:r>
-              <a:rPr lang="pt-BR" dirty="0" smtClean="0"/>
-              <a:t>libera</a:t>
-            </a:r>
-            <a:endParaRPr lang="pt-BR" dirty="0"/>
-          </a:p>
-        </p:txBody>
-      </p:sp>
-      <p:sp>
-        <p:nvSpPr>
-          <p:cNvPr id="88" name="Retângulo 87"/>
-          <p:cNvSpPr/>
-          <p:nvPr/>
-        </p:nvSpPr>
-        <p:spPr>
-          <a:xfrm>
-            <a:off x="693364" y="4444167"/>
-            <a:ext cx="1125045" cy="290945"/>
-          </a:xfrm>
-          <a:prstGeom prst="rect">
-            <a:avLst/>
-          </a:prstGeom>
-        </p:spPr>
-        <p:style>
-          <a:lnRef idx="2">
-            <a:schemeClr val="accent1">
-              <a:shade val="50000"/>
-            </a:schemeClr>
-          </a:lnRef>
-          <a:fillRef idx="1">
-            <a:schemeClr val="accent1"/>
-          </a:fillRef>
-          <a:effectRef idx="0">
-            <a:schemeClr val="accent1"/>
-          </a:effectRef>
-          <a:fontRef idx="minor">
-            <a:schemeClr val="lt1"/>
-          </a:fontRef>
-        </p:style>
-        <p:txBody>
-          <a:bodyPr rtlCol="0" anchor="ctr"/>
-          <a:lstStyle/>
-          <a:p>
-            <a:pPr algn="ctr"/>
-            <a:r>
-              <a:rPr lang="pt-BR" dirty="0" smtClean="0"/>
-              <a:t>bloqueia</a:t>
-            </a:r>
-            <a:endParaRPr lang="pt-BR" dirty="0"/>
-          </a:p>
-        </p:txBody>
-      </p:sp>
-      <p:cxnSp>
-        <p:nvCxnSpPr>
-          <p:cNvPr id="58" name="Conector angulado 57"/>
-          <p:cNvCxnSpPr>
-            <a:stCxn id="60" idx="1"/>
-            <a:endCxn id="88" idx="2"/>
-          </p:cNvCxnSpPr>
-          <p:nvPr/>
-        </p:nvCxnSpPr>
-        <p:spPr>
-          <a:xfrm rot="10800000" flipH="1">
-            <a:off x="849779" y="4735113"/>
-            <a:ext cx="406107" cy="986169"/>
-          </a:xfrm>
-          <a:prstGeom prst="bentConnector4">
-            <a:avLst>
-              <a:gd name="adj1" fmla="val -56291"/>
-              <a:gd name="adj2" fmla="val 73916"/>
-            </a:avLst>
-          </a:prstGeom>
-          <a:ln>
-            <a:tailEnd type="arrow"/>
-          </a:ln>
-        </p:spPr>
-        <p:style>
-          <a:lnRef idx="1">
-            <a:schemeClr val="accent1"/>
-          </a:lnRef>
-          <a:fillRef idx="0">
-            <a:schemeClr val="accent1"/>
-          </a:fillRef>
-          <a:effectRef idx="0">
-            <a:schemeClr val="accent1"/>
-          </a:effectRef>
-          <a:fontRef idx="minor">
-            <a:schemeClr val="tx1"/>
-          </a:fontRef>
-        </p:style>
-      </p:cxnSp>
-      <p:sp>
-        <p:nvSpPr>
-          <p:cNvPr id="94" name="CaixaDeTexto 93"/>
+              <a:rPr lang="pt-BR" dirty="0"/>
+              <a:t>S</a:t>
+            </a:r>
+          </a:p>
+        </p:txBody>
+      </p:sp>
+      <p:sp>
+        <p:nvSpPr>
+          <p:cNvPr id="158" name="CaixaDeTexto 157"/>
           <p:cNvSpPr txBox="1"/>
           <p:nvPr/>
         </p:nvSpPr>
         <p:spPr>
           <a:xfrm>
-            <a:off x="1884569" y="5054794"/>
-            <a:ext cx="290464" cy="369332"/>
+            <a:off x="801683" y="4672666"/>
+            <a:ext cx="333746" cy="369332"/>
           </a:xfrm>
           <a:prstGeom prst="rect">
             <a:avLst/>
@@ -10145,1658 +10116,10 @@
           <a:lstStyle/>
           <a:p>
             <a:r>
-              <a:rPr lang="pt-BR" dirty="0"/>
-              <a:t>S</a:t>
-            </a:r>
-          </a:p>
-        </p:txBody>
-      </p:sp>
-      <p:sp>
-        <p:nvSpPr>
-          <p:cNvPr id="95" name="CaixaDeTexto 94"/>
-          <p:cNvSpPr txBox="1"/>
-          <p:nvPr/>
-        </p:nvSpPr>
-        <p:spPr>
-          <a:xfrm>
-            <a:off x="682906" y="5247794"/>
-            <a:ext cx="333746" cy="369332"/>
-          </a:xfrm>
-          <a:prstGeom prst="rect">
-            <a:avLst/>
-          </a:prstGeom>
-          <a:noFill/>
-        </p:spPr>
-        <p:txBody>
-          <a:bodyPr wrap="none" rtlCol="0">
-            <a:spAutoFit/>
-          </a:bodyPr>
-          <a:lstStyle/>
-          <a:p>
-            <a:r>
               <a:rPr lang="pt-BR" dirty="0" smtClean="0"/>
               <a:t>N</a:t>
             </a:r>
             <a:endParaRPr lang="pt-BR" dirty="0"/>
-          </a:p>
-        </p:txBody>
-      </p:sp>
-      <p:sp>
-        <p:nvSpPr>
-          <p:cNvPr id="97" name="Elipse 96"/>
-          <p:cNvSpPr/>
-          <p:nvPr/>
-        </p:nvSpPr>
-        <p:spPr>
-          <a:xfrm>
-            <a:off x="1777741" y="3753241"/>
-            <a:ext cx="213655" cy="238991"/>
-          </a:xfrm>
-          <a:prstGeom prst="ellipse">
-            <a:avLst/>
-          </a:prstGeom>
-        </p:spPr>
-        <p:style>
-          <a:lnRef idx="2">
-            <a:schemeClr val="accent1">
-              <a:shade val="50000"/>
-            </a:schemeClr>
-          </a:lnRef>
-          <a:fillRef idx="1">
-            <a:schemeClr val="accent1"/>
-          </a:fillRef>
-          <a:effectRef idx="0">
-            <a:schemeClr val="accent1"/>
-          </a:effectRef>
-          <a:fontRef idx="minor">
-            <a:schemeClr val="lt1"/>
-          </a:fontRef>
-        </p:style>
-        <p:txBody>
-          <a:bodyPr rtlCol="0" anchor="ctr"/>
-          <a:lstStyle/>
-          <a:p>
-            <a:pPr algn="ctr"/>
-            <a:endParaRPr lang="pt-BR" dirty="0"/>
-          </a:p>
-        </p:txBody>
-      </p:sp>
-      <p:cxnSp>
-        <p:nvCxnSpPr>
-          <p:cNvPr id="62" name="Conector angulado 61"/>
-          <p:cNvCxnSpPr>
-            <a:stCxn id="81" idx="0"/>
-            <a:endCxn id="97" idx="6"/>
-          </p:cNvCxnSpPr>
-          <p:nvPr/>
-        </p:nvCxnSpPr>
-        <p:spPr>
-          <a:xfrm rot="16200000" flipV="1">
-            <a:off x="1941202" y="3922932"/>
-            <a:ext cx="571431" cy="471042"/>
-          </a:xfrm>
-          <a:prstGeom prst="bentConnector2">
-            <a:avLst/>
-          </a:prstGeom>
-          <a:ln>
-            <a:tailEnd type="arrow"/>
-          </a:ln>
-        </p:spPr>
-        <p:style>
-          <a:lnRef idx="1">
-            <a:schemeClr val="accent1"/>
-          </a:lnRef>
-          <a:fillRef idx="0">
-            <a:schemeClr val="accent1"/>
-          </a:fillRef>
-          <a:effectRef idx="0">
-            <a:schemeClr val="accent1"/>
-          </a:effectRef>
-          <a:fontRef idx="minor">
-            <a:schemeClr val="tx1"/>
-          </a:fontRef>
-        </p:style>
-      </p:cxnSp>
-      <p:cxnSp>
-        <p:nvCxnSpPr>
-          <p:cNvPr id="65" name="Conector angulado 64"/>
-          <p:cNvCxnSpPr>
-            <a:stCxn id="88" idx="0"/>
-            <a:endCxn id="97" idx="2"/>
-          </p:cNvCxnSpPr>
-          <p:nvPr/>
-        </p:nvCxnSpPr>
-        <p:spPr>
-          <a:xfrm rot="5400000" flipH="1" flipV="1">
-            <a:off x="1231099" y="3897525"/>
-            <a:ext cx="571430" cy="521854"/>
-          </a:xfrm>
-          <a:prstGeom prst="bentConnector2">
-            <a:avLst/>
-          </a:prstGeom>
-          <a:ln>
-            <a:tailEnd type="arrow"/>
-          </a:ln>
-        </p:spPr>
-        <p:style>
-          <a:lnRef idx="1">
-            <a:schemeClr val="accent1"/>
-          </a:lnRef>
-          <a:fillRef idx="0">
-            <a:schemeClr val="accent1"/>
-          </a:fillRef>
-          <a:effectRef idx="0">
-            <a:schemeClr val="accent1"/>
-          </a:effectRef>
-          <a:fontRef idx="minor">
-            <a:schemeClr val="tx1"/>
-          </a:fontRef>
-        </p:style>
-      </p:cxnSp>
-      <p:cxnSp>
-        <p:nvCxnSpPr>
-          <p:cNvPr id="67" name="Conector angulado 66"/>
-          <p:cNvCxnSpPr>
-            <a:stCxn id="97" idx="0"/>
-            <a:endCxn id="3" idx="2"/>
-          </p:cNvCxnSpPr>
-          <p:nvPr/>
-        </p:nvCxnSpPr>
-        <p:spPr>
-          <a:xfrm rot="5400000" flipH="1" flipV="1">
-            <a:off x="2414018" y="2804520"/>
-            <a:ext cx="419272" cy="1478170"/>
-          </a:xfrm>
-          <a:prstGeom prst="bentConnector2">
-            <a:avLst/>
-          </a:prstGeom>
-          <a:ln>
-            <a:tailEnd type="arrow"/>
-          </a:ln>
-        </p:spPr>
-        <p:style>
-          <a:lnRef idx="1">
-            <a:schemeClr val="accent1"/>
-          </a:lnRef>
-          <a:fillRef idx="0">
-            <a:schemeClr val="accent1"/>
-          </a:fillRef>
-          <a:effectRef idx="0">
-            <a:schemeClr val="accent1"/>
-          </a:effectRef>
-          <a:fontRef idx="minor">
-            <a:schemeClr val="tx1"/>
-          </a:fontRef>
-        </p:style>
-      </p:cxnSp>
-      <p:sp>
-        <p:nvSpPr>
-          <p:cNvPr id="105" name="Losango 104"/>
-          <p:cNvSpPr/>
-          <p:nvPr/>
-        </p:nvSpPr>
-        <p:spPr>
-          <a:xfrm>
-            <a:off x="4800600" y="3760944"/>
-            <a:ext cx="2660074" cy="843045"/>
-          </a:xfrm>
-          <a:prstGeom prst="diamond">
-            <a:avLst/>
-          </a:prstGeom>
-        </p:spPr>
-        <p:style>
-          <a:lnRef idx="2">
-            <a:schemeClr val="accent1">
-              <a:shade val="50000"/>
-            </a:schemeClr>
-          </a:lnRef>
-          <a:fillRef idx="1">
-            <a:schemeClr val="accent1"/>
-          </a:fillRef>
-          <a:effectRef idx="0">
-            <a:schemeClr val="accent1"/>
-          </a:effectRef>
-          <a:fontRef idx="minor">
-            <a:schemeClr val="lt1"/>
-          </a:fontRef>
-        </p:style>
-        <p:txBody>
-          <a:bodyPr rtlCol="0" anchor="ctr"/>
-          <a:lstStyle/>
-          <a:p>
-            <a:pPr algn="ctr"/>
-            <a:r>
-              <a:rPr lang="pt-BR" dirty="0" err="1" smtClean="0"/>
-              <a:t>Tag</a:t>
-            </a:r>
-            <a:r>
-              <a:rPr lang="pt-BR" dirty="0" smtClean="0"/>
-              <a:t> cadastrada?</a:t>
-            </a:r>
-            <a:endParaRPr lang="pt-BR" dirty="0"/>
-          </a:p>
-        </p:txBody>
-      </p:sp>
-      <p:sp>
-        <p:nvSpPr>
-          <p:cNvPr id="107" name="Elipse 106"/>
-          <p:cNvSpPr/>
-          <p:nvPr/>
-        </p:nvSpPr>
-        <p:spPr>
-          <a:xfrm>
-            <a:off x="6032682" y="2726955"/>
-            <a:ext cx="213655" cy="238991"/>
-          </a:xfrm>
-          <a:prstGeom prst="ellipse">
-            <a:avLst/>
-          </a:prstGeom>
-        </p:spPr>
-        <p:style>
-          <a:lnRef idx="2">
-            <a:schemeClr val="accent1">
-              <a:shade val="50000"/>
-            </a:schemeClr>
-          </a:lnRef>
-          <a:fillRef idx="1">
-            <a:schemeClr val="accent1"/>
-          </a:fillRef>
-          <a:effectRef idx="0">
-            <a:schemeClr val="accent1"/>
-          </a:effectRef>
-          <a:fontRef idx="minor">
-            <a:schemeClr val="lt1"/>
-          </a:fontRef>
-        </p:style>
-        <p:txBody>
-          <a:bodyPr rtlCol="0" anchor="ctr"/>
-          <a:lstStyle/>
-          <a:p>
-            <a:pPr algn="ctr"/>
-            <a:r>
-              <a:rPr lang="pt-BR" dirty="0"/>
-              <a:t>A</a:t>
-            </a:r>
-          </a:p>
-        </p:txBody>
-      </p:sp>
-      <p:sp>
-        <p:nvSpPr>
-          <p:cNvPr id="108" name="Retângulo 107"/>
-          <p:cNvSpPr/>
-          <p:nvPr/>
-        </p:nvSpPr>
-        <p:spPr>
-          <a:xfrm>
-            <a:off x="5672127" y="3272435"/>
-            <a:ext cx="934765" cy="290945"/>
-          </a:xfrm>
-          <a:prstGeom prst="rect">
-            <a:avLst/>
-          </a:prstGeom>
-        </p:spPr>
-        <p:style>
-          <a:lnRef idx="2">
-            <a:schemeClr val="accent1">
-              <a:shade val="50000"/>
-            </a:schemeClr>
-          </a:lnRef>
-          <a:fillRef idx="1">
-            <a:schemeClr val="accent1"/>
-          </a:fillRef>
-          <a:effectRef idx="0">
-            <a:schemeClr val="accent1"/>
-          </a:effectRef>
-          <a:fontRef idx="minor">
-            <a:schemeClr val="lt1"/>
-          </a:fontRef>
-        </p:style>
-        <p:txBody>
-          <a:bodyPr rtlCol="0" anchor="ctr"/>
-          <a:lstStyle/>
-          <a:p>
-            <a:pPr algn="ctr"/>
-            <a:r>
-              <a:rPr lang="pt-BR" dirty="0" smtClean="0"/>
-              <a:t>libera</a:t>
-            </a:r>
-            <a:endParaRPr lang="pt-BR" dirty="0"/>
-          </a:p>
-        </p:txBody>
-      </p:sp>
-      <p:sp>
-        <p:nvSpPr>
-          <p:cNvPr id="109" name="Retângulo 108"/>
-          <p:cNvSpPr/>
-          <p:nvPr/>
-        </p:nvSpPr>
-        <p:spPr>
-          <a:xfrm>
-            <a:off x="7183654" y="3269024"/>
-            <a:ext cx="1125045" cy="290945"/>
-          </a:xfrm>
-          <a:prstGeom prst="rect">
-            <a:avLst/>
-          </a:prstGeom>
-        </p:spPr>
-        <p:style>
-          <a:lnRef idx="2">
-            <a:schemeClr val="accent1">
-              <a:shade val="50000"/>
-            </a:schemeClr>
-          </a:lnRef>
-          <a:fillRef idx="1">
-            <a:schemeClr val="accent1"/>
-          </a:fillRef>
-          <a:effectRef idx="0">
-            <a:schemeClr val="accent1"/>
-          </a:effectRef>
-          <a:fontRef idx="minor">
-            <a:schemeClr val="lt1"/>
-          </a:fontRef>
-        </p:style>
-        <p:txBody>
-          <a:bodyPr rtlCol="0" anchor="ctr"/>
-          <a:lstStyle/>
-          <a:p>
-            <a:pPr algn="ctr"/>
-            <a:r>
-              <a:rPr lang="pt-BR" dirty="0" smtClean="0"/>
-              <a:t>bloqueia</a:t>
-            </a:r>
-            <a:endParaRPr lang="pt-BR" dirty="0"/>
-          </a:p>
-        </p:txBody>
-      </p:sp>
-      <p:cxnSp>
-        <p:nvCxnSpPr>
-          <p:cNvPr id="69" name="Conector de seta reta 68"/>
-          <p:cNvCxnSpPr>
-            <a:stCxn id="105" idx="0"/>
-            <a:endCxn id="108" idx="2"/>
-          </p:cNvCxnSpPr>
-          <p:nvPr/>
-        </p:nvCxnSpPr>
-        <p:spPr>
-          <a:xfrm flipV="1">
-            <a:off x="6130637" y="3563380"/>
-            <a:ext cx="8873" cy="197564"/>
-          </a:xfrm>
-          <a:prstGeom prst="straightConnector1">
-            <a:avLst/>
-          </a:prstGeom>
-          <a:ln>
-            <a:tailEnd type="arrow"/>
-          </a:ln>
-        </p:spPr>
-        <p:style>
-          <a:lnRef idx="1">
-            <a:schemeClr val="accent1"/>
-          </a:lnRef>
-          <a:fillRef idx="0">
-            <a:schemeClr val="accent1"/>
-          </a:fillRef>
-          <a:effectRef idx="0">
-            <a:schemeClr val="accent1"/>
-          </a:effectRef>
-          <a:fontRef idx="minor">
-            <a:schemeClr val="tx1"/>
-          </a:fontRef>
-        </p:style>
-      </p:cxnSp>
-      <p:cxnSp>
-        <p:nvCxnSpPr>
-          <p:cNvPr id="73" name="Conector de seta reta 72"/>
-          <p:cNvCxnSpPr>
-            <a:stCxn id="108" idx="0"/>
-            <a:endCxn id="107" idx="4"/>
-          </p:cNvCxnSpPr>
-          <p:nvPr/>
-        </p:nvCxnSpPr>
-        <p:spPr>
-          <a:xfrm flipV="1">
-            <a:off x="6139510" y="2965946"/>
-            <a:ext cx="0" cy="306489"/>
-          </a:xfrm>
-          <a:prstGeom prst="straightConnector1">
-            <a:avLst/>
-          </a:prstGeom>
-          <a:ln>
-            <a:tailEnd type="arrow"/>
-          </a:ln>
-        </p:spPr>
-        <p:style>
-          <a:lnRef idx="1">
-            <a:schemeClr val="accent1"/>
-          </a:lnRef>
-          <a:fillRef idx="0">
-            <a:schemeClr val="accent1"/>
-          </a:fillRef>
-          <a:effectRef idx="0">
-            <a:schemeClr val="accent1"/>
-          </a:effectRef>
-          <a:fontRef idx="minor">
-            <a:schemeClr val="tx1"/>
-          </a:fontRef>
-        </p:style>
-      </p:cxnSp>
-      <p:sp>
-        <p:nvSpPr>
-          <p:cNvPr id="118" name="CaixaDeTexto 117"/>
-          <p:cNvSpPr txBox="1"/>
-          <p:nvPr/>
-        </p:nvSpPr>
-        <p:spPr>
-          <a:xfrm>
-            <a:off x="5615290" y="3529728"/>
-            <a:ext cx="290464" cy="369332"/>
-          </a:xfrm>
-          <a:prstGeom prst="rect">
-            <a:avLst/>
-          </a:prstGeom>
-          <a:noFill/>
-        </p:spPr>
-        <p:txBody>
-          <a:bodyPr wrap="none" rtlCol="0">
-            <a:spAutoFit/>
-          </a:bodyPr>
-          <a:lstStyle/>
-          <a:p>
-            <a:r>
-              <a:rPr lang="pt-BR" dirty="0"/>
-              <a:t>S</a:t>
-            </a:r>
-          </a:p>
-        </p:txBody>
-      </p:sp>
-      <p:cxnSp>
-        <p:nvCxnSpPr>
-          <p:cNvPr id="77" name="Conector de seta reta 76"/>
-          <p:cNvCxnSpPr>
-            <a:stCxn id="105" idx="3"/>
-            <a:endCxn id="105" idx="3"/>
-          </p:cNvCxnSpPr>
-          <p:nvPr/>
-        </p:nvCxnSpPr>
-        <p:spPr>
-          <a:xfrm>
-            <a:off x="7460674" y="4182467"/>
-            <a:ext cx="0" cy="0"/>
-          </a:xfrm>
-          <a:prstGeom prst="straightConnector1">
-            <a:avLst/>
-          </a:prstGeom>
-          <a:ln>
-            <a:tailEnd type="arrow"/>
-          </a:ln>
-        </p:spPr>
-        <p:style>
-          <a:lnRef idx="1">
-            <a:schemeClr val="accent1"/>
-          </a:lnRef>
-          <a:fillRef idx="0">
-            <a:schemeClr val="accent1"/>
-          </a:fillRef>
-          <a:effectRef idx="0">
-            <a:schemeClr val="accent1"/>
-          </a:effectRef>
-          <a:fontRef idx="minor">
-            <a:schemeClr val="tx1"/>
-          </a:fontRef>
-        </p:style>
-      </p:cxnSp>
-      <p:cxnSp>
-        <p:nvCxnSpPr>
-          <p:cNvPr id="79" name="Conector angulado 78"/>
-          <p:cNvCxnSpPr>
-            <a:stCxn id="105" idx="3"/>
-            <a:endCxn id="109" idx="2"/>
-          </p:cNvCxnSpPr>
-          <p:nvPr/>
-        </p:nvCxnSpPr>
-        <p:spPr>
-          <a:xfrm flipV="1">
-            <a:off x="7460674" y="3559969"/>
-            <a:ext cx="285503" cy="622498"/>
-          </a:xfrm>
-          <a:prstGeom prst="bentConnector2">
-            <a:avLst/>
-          </a:prstGeom>
-          <a:ln>
-            <a:tailEnd type="arrow"/>
-          </a:ln>
-        </p:spPr>
-        <p:style>
-          <a:lnRef idx="1">
-            <a:schemeClr val="accent1"/>
-          </a:lnRef>
-          <a:fillRef idx="0">
-            <a:schemeClr val="accent1"/>
-          </a:fillRef>
-          <a:effectRef idx="0">
-            <a:schemeClr val="accent1"/>
-          </a:effectRef>
-          <a:fontRef idx="minor">
-            <a:schemeClr val="tx1"/>
-          </a:fontRef>
-        </p:style>
-      </p:cxnSp>
-      <p:cxnSp>
-        <p:nvCxnSpPr>
-          <p:cNvPr id="82" name="Conector angulado 81"/>
-          <p:cNvCxnSpPr>
-            <a:stCxn id="109" idx="0"/>
-            <a:endCxn id="107" idx="6"/>
-          </p:cNvCxnSpPr>
-          <p:nvPr/>
-        </p:nvCxnSpPr>
-        <p:spPr>
-          <a:xfrm rot="16200000" flipV="1">
-            <a:off x="6784971" y="2307818"/>
-            <a:ext cx="422573" cy="1499840"/>
-          </a:xfrm>
-          <a:prstGeom prst="bentConnector2">
-            <a:avLst/>
-          </a:prstGeom>
-          <a:ln>
-            <a:tailEnd type="arrow"/>
-          </a:ln>
-        </p:spPr>
-        <p:style>
-          <a:lnRef idx="1">
-            <a:schemeClr val="accent1"/>
-          </a:lnRef>
-          <a:fillRef idx="0">
-            <a:schemeClr val="accent1"/>
-          </a:fillRef>
-          <a:effectRef idx="0">
-            <a:schemeClr val="accent1"/>
-          </a:effectRef>
-          <a:fontRef idx="minor">
-            <a:schemeClr val="tx1"/>
-          </a:fontRef>
-        </p:style>
-      </p:cxnSp>
-      <p:sp>
-        <p:nvSpPr>
-          <p:cNvPr id="125" name="CaixaDeTexto 124"/>
-          <p:cNvSpPr txBox="1"/>
-          <p:nvPr/>
-        </p:nvSpPr>
-        <p:spPr>
-          <a:xfrm>
-            <a:off x="7412430" y="3804942"/>
-            <a:ext cx="333746" cy="369332"/>
-          </a:xfrm>
-          <a:prstGeom prst="rect">
-            <a:avLst/>
-          </a:prstGeom>
-          <a:noFill/>
-        </p:spPr>
-        <p:txBody>
-          <a:bodyPr wrap="none" rtlCol="0">
-            <a:spAutoFit/>
-          </a:bodyPr>
-          <a:lstStyle/>
-          <a:p>
-            <a:r>
-              <a:rPr lang="pt-BR" dirty="0" smtClean="0"/>
-              <a:t>N</a:t>
-            </a:r>
-            <a:endParaRPr lang="pt-BR" dirty="0"/>
-          </a:p>
-        </p:txBody>
-      </p:sp>
-      <p:sp>
-        <p:nvSpPr>
-          <p:cNvPr id="126" name="Losango 125"/>
-          <p:cNvSpPr/>
-          <p:nvPr/>
-        </p:nvSpPr>
-        <p:spPr>
-          <a:xfrm>
-            <a:off x="6794753" y="5103171"/>
-            <a:ext cx="1528295" cy="843045"/>
-          </a:xfrm>
-          <a:prstGeom prst="diamond">
-            <a:avLst/>
-          </a:prstGeom>
-        </p:spPr>
-        <p:style>
-          <a:lnRef idx="2">
-            <a:schemeClr val="accent1">
-              <a:shade val="50000"/>
-            </a:schemeClr>
-          </a:lnRef>
-          <a:fillRef idx="1">
-            <a:schemeClr val="accent1"/>
-          </a:fillRef>
-          <a:effectRef idx="0">
-            <a:schemeClr val="accent1"/>
-          </a:effectRef>
-          <a:fontRef idx="minor">
-            <a:schemeClr val="lt1"/>
-          </a:fontRef>
-        </p:style>
-        <p:txBody>
-          <a:bodyPr rtlCol="0" anchor="ctr"/>
-          <a:lstStyle/>
-          <a:p>
-            <a:pPr algn="ctr"/>
-            <a:r>
-              <a:rPr lang="pt-BR" dirty="0" smtClean="0"/>
-              <a:t>Tem </a:t>
-            </a:r>
-            <a:r>
-              <a:rPr lang="pt-BR" dirty="0" err="1" smtClean="0"/>
-              <a:t>tag</a:t>
-            </a:r>
-            <a:r>
-              <a:rPr lang="pt-BR" dirty="0" smtClean="0"/>
-              <a:t>?</a:t>
-            </a:r>
-            <a:endParaRPr lang="pt-BR" dirty="0"/>
-          </a:p>
-        </p:txBody>
-      </p:sp>
-      <p:cxnSp>
-        <p:nvCxnSpPr>
-          <p:cNvPr id="84" name="Conector angulado 83"/>
-          <p:cNvCxnSpPr>
-            <a:stCxn id="46" idx="6"/>
-            <a:endCxn id="126" idx="1"/>
-          </p:cNvCxnSpPr>
-          <p:nvPr/>
-        </p:nvCxnSpPr>
-        <p:spPr>
-          <a:xfrm flipV="1">
-            <a:off x="6596685" y="5524694"/>
-            <a:ext cx="198068" cy="450078"/>
-          </a:xfrm>
-          <a:prstGeom prst="bentConnector3">
-            <a:avLst>
-              <a:gd name="adj1" fmla="val 23769"/>
-            </a:avLst>
-          </a:prstGeom>
-          <a:ln>
-            <a:tailEnd type="arrow"/>
-          </a:ln>
-        </p:spPr>
-        <p:style>
-          <a:lnRef idx="1">
-            <a:schemeClr val="accent1"/>
-          </a:lnRef>
-          <a:fillRef idx="0">
-            <a:schemeClr val="accent1"/>
-          </a:fillRef>
-          <a:effectRef idx="0">
-            <a:schemeClr val="accent1"/>
-          </a:effectRef>
-          <a:fontRef idx="minor">
-            <a:schemeClr val="tx1"/>
-          </a:fontRef>
-        </p:style>
-      </p:cxnSp>
-      <p:cxnSp>
-        <p:nvCxnSpPr>
-          <p:cNvPr id="86" name="Conector angulado 85"/>
-          <p:cNvCxnSpPr>
-            <a:stCxn id="126" idx="0"/>
-            <a:endCxn id="46" idx="4"/>
-          </p:cNvCxnSpPr>
-          <p:nvPr/>
-        </p:nvCxnSpPr>
-        <p:spPr>
-          <a:xfrm rot="16200000" flipH="1" flipV="1">
-            <a:off x="6528832" y="5064197"/>
-            <a:ext cx="991096" cy="1069043"/>
-          </a:xfrm>
-          <a:prstGeom prst="bentConnector5">
-            <a:avLst>
-              <a:gd name="adj1" fmla="val 109037"/>
-              <a:gd name="adj2" fmla="val 80743"/>
-              <a:gd name="adj3" fmla="val 109435"/>
-            </a:avLst>
-          </a:prstGeom>
-          <a:ln>
-            <a:tailEnd type="arrow"/>
-          </a:ln>
-        </p:spPr>
-        <p:style>
-          <a:lnRef idx="1">
-            <a:schemeClr val="accent1"/>
-          </a:lnRef>
-          <a:fillRef idx="0">
-            <a:schemeClr val="accent1"/>
-          </a:fillRef>
-          <a:effectRef idx="0">
-            <a:schemeClr val="accent1"/>
-          </a:effectRef>
-          <a:fontRef idx="minor">
-            <a:schemeClr val="tx1"/>
-          </a:fontRef>
-        </p:style>
-      </p:cxnSp>
-      <p:sp>
-        <p:nvSpPr>
-          <p:cNvPr id="132" name="Losango 131"/>
-          <p:cNvSpPr/>
-          <p:nvPr/>
-        </p:nvSpPr>
-        <p:spPr>
-          <a:xfrm>
-            <a:off x="8724449" y="5102656"/>
-            <a:ext cx="1528295" cy="843045"/>
-          </a:xfrm>
-          <a:prstGeom prst="diamond">
-            <a:avLst/>
-          </a:prstGeom>
-        </p:spPr>
-        <p:style>
-          <a:lnRef idx="2">
-            <a:schemeClr val="accent1">
-              <a:shade val="50000"/>
-            </a:schemeClr>
-          </a:lnRef>
-          <a:fillRef idx="1">
-            <a:schemeClr val="accent1"/>
-          </a:fillRef>
-          <a:effectRef idx="0">
-            <a:schemeClr val="accent1"/>
-          </a:effectRef>
-          <a:fontRef idx="minor">
-            <a:schemeClr val="lt1"/>
-          </a:fontRef>
-        </p:style>
-        <p:txBody>
-          <a:bodyPr rtlCol="0" anchor="ctr"/>
-          <a:lstStyle/>
-          <a:p>
-            <a:pPr algn="ctr"/>
-            <a:r>
-              <a:rPr lang="pt-BR" dirty="0" smtClean="0"/>
-              <a:t>É o </a:t>
-            </a:r>
-            <a:r>
-              <a:rPr lang="pt-BR" dirty="0" err="1" smtClean="0"/>
-              <a:t>Adm</a:t>
-            </a:r>
-            <a:r>
-              <a:rPr lang="pt-BR" dirty="0" smtClean="0"/>
-              <a:t>?</a:t>
-            </a:r>
-            <a:endParaRPr lang="pt-BR" dirty="0"/>
-          </a:p>
-        </p:txBody>
-      </p:sp>
-      <p:cxnSp>
-        <p:nvCxnSpPr>
-          <p:cNvPr id="89" name="Conector de seta reta 88"/>
-          <p:cNvCxnSpPr>
-            <a:stCxn id="126" idx="3"/>
-            <a:endCxn id="132" idx="1"/>
-          </p:cNvCxnSpPr>
-          <p:nvPr/>
-        </p:nvCxnSpPr>
-        <p:spPr>
-          <a:xfrm flipV="1">
-            <a:off x="8323048" y="5524179"/>
-            <a:ext cx="401401" cy="515"/>
-          </a:xfrm>
-          <a:prstGeom prst="straightConnector1">
-            <a:avLst/>
-          </a:prstGeom>
-          <a:ln>
-            <a:tailEnd type="arrow"/>
-          </a:ln>
-        </p:spPr>
-        <p:style>
-          <a:lnRef idx="1">
-            <a:schemeClr val="accent1"/>
-          </a:lnRef>
-          <a:fillRef idx="0">
-            <a:schemeClr val="accent1"/>
-          </a:fillRef>
-          <a:effectRef idx="0">
-            <a:schemeClr val="accent1"/>
-          </a:effectRef>
-          <a:fontRef idx="minor">
-            <a:schemeClr val="tx1"/>
-          </a:fontRef>
-        </p:style>
-      </p:cxnSp>
-      <p:sp>
-        <p:nvSpPr>
-          <p:cNvPr id="135" name="CaixaDeTexto 134"/>
-          <p:cNvSpPr txBox="1"/>
-          <p:nvPr/>
-        </p:nvSpPr>
-        <p:spPr>
-          <a:xfrm>
-            <a:off x="8302646" y="5112196"/>
-            <a:ext cx="290464" cy="369332"/>
-          </a:xfrm>
-          <a:prstGeom prst="rect">
-            <a:avLst/>
-          </a:prstGeom>
-          <a:noFill/>
-        </p:spPr>
-        <p:txBody>
-          <a:bodyPr wrap="none" rtlCol="0">
-            <a:spAutoFit/>
-          </a:bodyPr>
-          <a:lstStyle/>
-          <a:p>
-            <a:r>
-              <a:rPr lang="pt-BR" dirty="0"/>
-              <a:t>S</a:t>
-            </a:r>
-          </a:p>
-        </p:txBody>
-      </p:sp>
-      <p:sp>
-        <p:nvSpPr>
-          <p:cNvPr id="136" name="Losango 135"/>
-          <p:cNvSpPr/>
-          <p:nvPr/>
-        </p:nvSpPr>
-        <p:spPr>
-          <a:xfrm>
-            <a:off x="8620679" y="4010461"/>
-            <a:ext cx="1735833" cy="843045"/>
-          </a:xfrm>
-          <a:prstGeom prst="diamond">
-            <a:avLst/>
-          </a:prstGeom>
-        </p:spPr>
-        <p:style>
-          <a:lnRef idx="2">
-            <a:schemeClr val="accent1">
-              <a:shade val="50000"/>
-            </a:schemeClr>
-          </a:lnRef>
-          <a:fillRef idx="1">
-            <a:schemeClr val="accent1"/>
-          </a:fillRef>
-          <a:effectRef idx="0">
-            <a:schemeClr val="accent1"/>
-          </a:effectRef>
-          <a:fontRef idx="minor">
-            <a:schemeClr val="lt1"/>
-          </a:fontRef>
-        </p:style>
-        <p:txBody>
-          <a:bodyPr rtlCol="0" anchor="ctr"/>
-          <a:lstStyle/>
-          <a:p>
-            <a:pPr algn="ctr"/>
-            <a:r>
-              <a:rPr lang="pt-BR" dirty="0" err="1" smtClean="0"/>
-              <a:t>Tag</a:t>
-            </a:r>
-            <a:r>
-              <a:rPr lang="pt-BR" dirty="0" smtClean="0"/>
-              <a:t> existe?</a:t>
-            </a:r>
-            <a:endParaRPr lang="pt-BR" dirty="0"/>
-          </a:p>
-        </p:txBody>
-      </p:sp>
-      <p:cxnSp>
-        <p:nvCxnSpPr>
-          <p:cNvPr id="91" name="Conector de seta reta 90"/>
-          <p:cNvCxnSpPr>
-            <a:stCxn id="132" idx="0"/>
-            <a:endCxn id="136" idx="2"/>
-          </p:cNvCxnSpPr>
-          <p:nvPr/>
-        </p:nvCxnSpPr>
-        <p:spPr>
-          <a:xfrm flipH="1" flipV="1">
-            <a:off x="9488596" y="4853506"/>
-            <a:ext cx="1" cy="249150"/>
-          </a:xfrm>
-          <a:prstGeom prst="straightConnector1">
-            <a:avLst/>
-          </a:prstGeom>
-          <a:ln>
-            <a:tailEnd type="arrow"/>
-          </a:ln>
-        </p:spPr>
-        <p:style>
-          <a:lnRef idx="1">
-            <a:schemeClr val="accent1"/>
-          </a:lnRef>
-          <a:fillRef idx="0">
-            <a:schemeClr val="accent1"/>
-          </a:fillRef>
-          <a:effectRef idx="0">
-            <a:schemeClr val="accent1"/>
-          </a:effectRef>
-          <a:fontRef idx="minor">
-            <a:schemeClr val="tx1"/>
-          </a:fontRef>
-        </p:style>
-      </p:cxnSp>
-      <p:sp>
-        <p:nvSpPr>
-          <p:cNvPr id="139" name="CaixaDeTexto 138"/>
-          <p:cNvSpPr txBox="1"/>
-          <p:nvPr/>
-        </p:nvSpPr>
-        <p:spPr>
-          <a:xfrm>
-            <a:off x="9081488" y="4784248"/>
-            <a:ext cx="333746" cy="369332"/>
-          </a:xfrm>
-          <a:prstGeom prst="rect">
-            <a:avLst/>
-          </a:prstGeom>
-          <a:noFill/>
-        </p:spPr>
-        <p:txBody>
-          <a:bodyPr wrap="none" rtlCol="0">
-            <a:spAutoFit/>
-          </a:bodyPr>
-          <a:lstStyle/>
-          <a:p>
-            <a:r>
-              <a:rPr lang="pt-BR" dirty="0" smtClean="0"/>
-              <a:t>N</a:t>
-            </a:r>
-            <a:endParaRPr lang="pt-BR" dirty="0"/>
-          </a:p>
-        </p:txBody>
-      </p:sp>
-      <p:sp>
-        <p:nvSpPr>
-          <p:cNvPr id="146" name="CaixaDeTexto 145"/>
-          <p:cNvSpPr txBox="1"/>
-          <p:nvPr/>
-        </p:nvSpPr>
-        <p:spPr>
-          <a:xfrm>
-            <a:off x="6954819" y="5807298"/>
-            <a:ext cx="333746" cy="369332"/>
-          </a:xfrm>
-          <a:prstGeom prst="rect">
-            <a:avLst/>
-          </a:prstGeom>
-          <a:noFill/>
-        </p:spPr>
-        <p:txBody>
-          <a:bodyPr wrap="none" rtlCol="0">
-            <a:spAutoFit/>
-          </a:bodyPr>
-          <a:lstStyle/>
-          <a:p>
-            <a:r>
-              <a:rPr lang="pt-BR" dirty="0" smtClean="0"/>
-              <a:t>N</a:t>
-            </a:r>
-            <a:endParaRPr lang="pt-BR" dirty="0"/>
-          </a:p>
-        </p:txBody>
-      </p:sp>
-      <p:cxnSp>
-        <p:nvCxnSpPr>
-          <p:cNvPr id="103" name="Conector de seta reta 102"/>
-          <p:cNvCxnSpPr>
-            <a:stCxn id="132" idx="3"/>
-          </p:cNvCxnSpPr>
-          <p:nvPr/>
-        </p:nvCxnSpPr>
-        <p:spPr>
-          <a:xfrm>
-            <a:off x="10252744" y="5524179"/>
-            <a:ext cx="238953" cy="16299"/>
-          </a:xfrm>
-          <a:prstGeom prst="straightConnector1">
-            <a:avLst/>
-          </a:prstGeom>
-          <a:ln>
-            <a:tailEnd type="arrow"/>
-          </a:ln>
-        </p:spPr>
-        <p:style>
-          <a:lnRef idx="1">
-            <a:schemeClr val="accent1"/>
-          </a:lnRef>
-          <a:fillRef idx="0">
-            <a:schemeClr val="accent1"/>
-          </a:fillRef>
-          <a:effectRef idx="0">
-            <a:schemeClr val="accent1"/>
-          </a:effectRef>
-          <a:fontRef idx="minor">
-            <a:schemeClr val="tx1"/>
-          </a:fontRef>
-        </p:style>
-      </p:cxnSp>
-      <p:sp>
-        <p:nvSpPr>
-          <p:cNvPr id="151" name="CaixaDeTexto 150"/>
-          <p:cNvSpPr txBox="1"/>
-          <p:nvPr/>
-        </p:nvSpPr>
-        <p:spPr>
-          <a:xfrm>
-            <a:off x="6996379" y="4840740"/>
-            <a:ext cx="333746" cy="369332"/>
-          </a:xfrm>
-          <a:prstGeom prst="rect">
-            <a:avLst/>
-          </a:prstGeom>
-          <a:noFill/>
-        </p:spPr>
-        <p:txBody>
-          <a:bodyPr wrap="none" rtlCol="0">
-            <a:spAutoFit/>
-          </a:bodyPr>
-          <a:lstStyle/>
-          <a:p>
-            <a:r>
-              <a:rPr lang="pt-BR" dirty="0" smtClean="0"/>
-              <a:t>N</a:t>
-            </a:r>
-            <a:endParaRPr lang="pt-BR" dirty="0"/>
-          </a:p>
-        </p:txBody>
-      </p:sp>
-      <p:sp>
-        <p:nvSpPr>
-          <p:cNvPr id="152" name="Elipse 151"/>
-          <p:cNvSpPr/>
-          <p:nvPr/>
-        </p:nvSpPr>
-        <p:spPr>
-          <a:xfrm>
-            <a:off x="10491697" y="5413077"/>
-            <a:ext cx="213655" cy="238991"/>
-          </a:xfrm>
-          <a:prstGeom prst="ellipse">
-            <a:avLst/>
-          </a:prstGeom>
-        </p:spPr>
-        <p:style>
-          <a:lnRef idx="2">
-            <a:schemeClr val="accent1">
-              <a:shade val="50000"/>
-            </a:schemeClr>
-          </a:lnRef>
-          <a:fillRef idx="1">
-            <a:schemeClr val="accent1"/>
-          </a:fillRef>
-          <a:effectRef idx="0">
-            <a:schemeClr val="accent1"/>
-          </a:effectRef>
-          <a:fontRef idx="minor">
-            <a:schemeClr val="lt1"/>
-          </a:fontRef>
-        </p:style>
-        <p:txBody>
-          <a:bodyPr rtlCol="0" anchor="ctr"/>
-          <a:lstStyle/>
-          <a:p>
-            <a:pPr algn="ctr"/>
-            <a:r>
-              <a:rPr lang="pt-BR" dirty="0"/>
-              <a:t>A</a:t>
-            </a:r>
-          </a:p>
-        </p:txBody>
-      </p:sp>
-      <p:sp>
-        <p:nvSpPr>
-          <p:cNvPr id="153" name="CaixaDeTexto 152"/>
-          <p:cNvSpPr txBox="1"/>
-          <p:nvPr/>
-        </p:nvSpPr>
-        <p:spPr>
-          <a:xfrm>
-            <a:off x="10201233" y="5090636"/>
-            <a:ext cx="290464" cy="369332"/>
-          </a:xfrm>
-          <a:prstGeom prst="rect">
-            <a:avLst/>
-          </a:prstGeom>
-          <a:noFill/>
-        </p:spPr>
-        <p:txBody>
-          <a:bodyPr wrap="none" rtlCol="0">
-            <a:spAutoFit/>
-          </a:bodyPr>
-          <a:lstStyle/>
-          <a:p>
-            <a:r>
-              <a:rPr lang="pt-BR" dirty="0"/>
-              <a:t>S</a:t>
-            </a:r>
-          </a:p>
-        </p:txBody>
-      </p:sp>
-      <p:sp>
-        <p:nvSpPr>
-          <p:cNvPr id="154" name="Retângulo 153"/>
-          <p:cNvSpPr/>
-          <p:nvPr/>
-        </p:nvSpPr>
-        <p:spPr>
-          <a:xfrm>
-            <a:off x="10598523" y="4174274"/>
-            <a:ext cx="934765" cy="487797"/>
-          </a:xfrm>
-          <a:prstGeom prst="rect">
-            <a:avLst/>
-          </a:prstGeom>
-        </p:spPr>
-        <p:style>
-          <a:lnRef idx="2">
-            <a:schemeClr val="accent1">
-              <a:shade val="50000"/>
-            </a:schemeClr>
-          </a:lnRef>
-          <a:fillRef idx="1">
-            <a:schemeClr val="accent1"/>
-          </a:fillRef>
-          <a:effectRef idx="0">
-            <a:schemeClr val="accent1"/>
-          </a:effectRef>
-          <a:fontRef idx="minor">
-            <a:schemeClr val="lt1"/>
-          </a:fontRef>
-        </p:style>
-        <p:txBody>
-          <a:bodyPr rtlCol="0" anchor="ctr"/>
-          <a:lstStyle/>
-          <a:p>
-            <a:pPr algn="ctr"/>
-            <a:r>
-              <a:rPr lang="pt-BR" dirty="0" smtClean="0"/>
-              <a:t>Apaga </a:t>
-            </a:r>
-            <a:r>
-              <a:rPr lang="pt-BR" dirty="0" err="1" smtClean="0"/>
-              <a:t>tag</a:t>
-            </a:r>
-            <a:endParaRPr lang="pt-BR" dirty="0"/>
-          </a:p>
-        </p:txBody>
-      </p:sp>
-      <p:cxnSp>
-        <p:nvCxnSpPr>
-          <p:cNvPr id="110" name="Conector de seta reta 109"/>
-          <p:cNvCxnSpPr>
-            <a:stCxn id="136" idx="3"/>
-            <a:endCxn id="154" idx="1"/>
-          </p:cNvCxnSpPr>
-          <p:nvPr/>
-        </p:nvCxnSpPr>
-        <p:spPr>
-          <a:xfrm flipV="1">
-            <a:off x="10356512" y="4418173"/>
-            <a:ext cx="242011" cy="13811"/>
-          </a:xfrm>
-          <a:prstGeom prst="straightConnector1">
-            <a:avLst/>
-          </a:prstGeom>
-          <a:ln>
-            <a:tailEnd type="arrow"/>
-          </a:ln>
-        </p:spPr>
-        <p:style>
-          <a:lnRef idx="1">
-            <a:schemeClr val="accent1"/>
-          </a:lnRef>
-          <a:fillRef idx="0">
-            <a:schemeClr val="accent1"/>
-          </a:fillRef>
-          <a:effectRef idx="0">
-            <a:schemeClr val="accent1"/>
-          </a:effectRef>
-          <a:fontRef idx="minor">
-            <a:schemeClr val="tx1"/>
-          </a:fontRef>
-        </p:style>
-      </p:cxnSp>
-      <p:sp>
-        <p:nvSpPr>
-          <p:cNvPr id="159" name="CaixaDeTexto 158"/>
-          <p:cNvSpPr txBox="1"/>
-          <p:nvPr/>
-        </p:nvSpPr>
-        <p:spPr>
-          <a:xfrm>
-            <a:off x="10263135" y="3973786"/>
-            <a:ext cx="290464" cy="369332"/>
-          </a:xfrm>
-          <a:prstGeom prst="rect">
-            <a:avLst/>
-          </a:prstGeom>
-          <a:noFill/>
-        </p:spPr>
-        <p:txBody>
-          <a:bodyPr wrap="none" rtlCol="0">
-            <a:spAutoFit/>
-          </a:bodyPr>
-          <a:lstStyle/>
-          <a:p>
-            <a:r>
-              <a:rPr lang="pt-BR" dirty="0"/>
-              <a:t>S</a:t>
-            </a:r>
-          </a:p>
-        </p:txBody>
-      </p:sp>
-      <p:sp>
-        <p:nvSpPr>
-          <p:cNvPr id="161" name="Retângulo 160"/>
-          <p:cNvSpPr/>
-          <p:nvPr/>
-        </p:nvSpPr>
-        <p:spPr>
-          <a:xfrm>
-            <a:off x="9021214" y="3265445"/>
-            <a:ext cx="934765" cy="487797"/>
-          </a:xfrm>
-          <a:prstGeom prst="rect">
-            <a:avLst/>
-          </a:prstGeom>
-        </p:spPr>
-        <p:style>
-          <a:lnRef idx="2">
-            <a:schemeClr val="accent1">
-              <a:shade val="50000"/>
-            </a:schemeClr>
-          </a:lnRef>
-          <a:fillRef idx="1">
-            <a:schemeClr val="accent1"/>
-          </a:fillRef>
-          <a:effectRef idx="0">
-            <a:schemeClr val="accent1"/>
-          </a:effectRef>
-          <a:fontRef idx="minor">
-            <a:schemeClr val="lt1"/>
-          </a:fontRef>
-        </p:style>
-        <p:txBody>
-          <a:bodyPr rtlCol="0" anchor="ctr"/>
-          <a:lstStyle/>
-          <a:p>
-            <a:pPr algn="ctr"/>
-            <a:r>
-              <a:rPr lang="pt-BR" dirty="0" smtClean="0"/>
-              <a:t>insere </a:t>
-            </a:r>
-            <a:r>
-              <a:rPr lang="pt-BR" dirty="0" err="1" smtClean="0"/>
-              <a:t>tag</a:t>
-            </a:r>
-            <a:endParaRPr lang="pt-BR" dirty="0"/>
-          </a:p>
-        </p:txBody>
-      </p:sp>
-      <p:sp>
-        <p:nvSpPr>
-          <p:cNvPr id="162" name="Elipse 161"/>
-          <p:cNvSpPr/>
-          <p:nvPr/>
-        </p:nvSpPr>
-        <p:spPr>
-          <a:xfrm>
-            <a:off x="10094405" y="2571941"/>
-            <a:ext cx="213655" cy="238991"/>
-          </a:xfrm>
-          <a:prstGeom prst="ellipse">
-            <a:avLst/>
-          </a:prstGeom>
-        </p:spPr>
-        <p:style>
-          <a:lnRef idx="2">
-            <a:schemeClr val="accent1">
-              <a:shade val="50000"/>
-            </a:schemeClr>
-          </a:lnRef>
-          <a:fillRef idx="1">
-            <a:schemeClr val="accent1"/>
-          </a:fillRef>
-          <a:effectRef idx="0">
-            <a:schemeClr val="accent1"/>
-          </a:effectRef>
-          <a:fontRef idx="minor">
-            <a:schemeClr val="lt1"/>
-          </a:fontRef>
-        </p:style>
-        <p:txBody>
-          <a:bodyPr rtlCol="0" anchor="ctr"/>
-          <a:lstStyle/>
-          <a:p>
-            <a:pPr algn="ctr"/>
-            <a:endParaRPr lang="pt-BR" dirty="0"/>
-          </a:p>
-        </p:txBody>
-      </p:sp>
-      <p:cxnSp>
-        <p:nvCxnSpPr>
-          <p:cNvPr id="114" name="Conector de seta reta 113"/>
-          <p:cNvCxnSpPr>
-            <a:stCxn id="136" idx="0"/>
-            <a:endCxn id="161" idx="2"/>
-          </p:cNvCxnSpPr>
-          <p:nvPr/>
-        </p:nvCxnSpPr>
-        <p:spPr>
-          <a:xfrm flipV="1">
-            <a:off x="9488596" y="3753242"/>
-            <a:ext cx="1" cy="257219"/>
-          </a:xfrm>
-          <a:prstGeom prst="straightConnector1">
-            <a:avLst/>
-          </a:prstGeom>
-          <a:ln>
-            <a:tailEnd type="arrow"/>
-          </a:ln>
-        </p:spPr>
-        <p:style>
-          <a:lnRef idx="1">
-            <a:schemeClr val="accent1"/>
-          </a:lnRef>
-          <a:fillRef idx="0">
-            <a:schemeClr val="accent1"/>
-          </a:fillRef>
-          <a:effectRef idx="0">
-            <a:schemeClr val="accent1"/>
-          </a:effectRef>
-          <a:fontRef idx="minor">
-            <a:schemeClr val="tx1"/>
-          </a:fontRef>
-        </p:style>
-      </p:cxnSp>
-      <p:sp>
-        <p:nvSpPr>
-          <p:cNvPr id="167" name="CaixaDeTexto 166"/>
-          <p:cNvSpPr txBox="1"/>
-          <p:nvPr/>
-        </p:nvSpPr>
-        <p:spPr>
-          <a:xfrm>
-            <a:off x="9623928" y="3760944"/>
-            <a:ext cx="333746" cy="369332"/>
-          </a:xfrm>
-          <a:prstGeom prst="rect">
-            <a:avLst/>
-          </a:prstGeom>
-          <a:noFill/>
-        </p:spPr>
-        <p:txBody>
-          <a:bodyPr wrap="none" rtlCol="0">
-            <a:spAutoFit/>
-          </a:bodyPr>
-          <a:lstStyle/>
-          <a:p>
-            <a:r>
-              <a:rPr lang="pt-BR" dirty="0" smtClean="0"/>
-              <a:t>N</a:t>
-            </a:r>
-            <a:endParaRPr lang="pt-BR" dirty="0"/>
-          </a:p>
-        </p:txBody>
-      </p:sp>
-      <p:cxnSp>
-        <p:nvCxnSpPr>
-          <p:cNvPr id="119" name="Conector angulado 118"/>
-          <p:cNvCxnSpPr>
-            <a:stCxn id="161" idx="0"/>
-            <a:endCxn id="162" idx="2"/>
-          </p:cNvCxnSpPr>
-          <p:nvPr/>
-        </p:nvCxnSpPr>
-        <p:spPr>
-          <a:xfrm rot="5400000" flipH="1" flipV="1">
-            <a:off x="9504497" y="2675537"/>
-            <a:ext cx="574008" cy="605808"/>
-          </a:xfrm>
-          <a:prstGeom prst="bentConnector2">
-            <a:avLst/>
-          </a:prstGeom>
-          <a:ln>
-            <a:tailEnd type="arrow"/>
-          </a:ln>
-        </p:spPr>
-        <p:style>
-          <a:lnRef idx="1">
-            <a:schemeClr val="accent1"/>
-          </a:lnRef>
-          <a:fillRef idx="0">
-            <a:schemeClr val="accent1"/>
-          </a:fillRef>
-          <a:effectRef idx="0">
-            <a:schemeClr val="accent1"/>
-          </a:effectRef>
-          <a:fontRef idx="minor">
-            <a:schemeClr val="tx1"/>
-          </a:fontRef>
-        </p:style>
-      </p:cxnSp>
-      <p:cxnSp>
-        <p:nvCxnSpPr>
-          <p:cNvPr id="121" name="Conector angulado 120"/>
-          <p:cNvCxnSpPr>
-            <a:stCxn id="154" idx="0"/>
-            <a:endCxn id="162" idx="6"/>
-          </p:cNvCxnSpPr>
-          <p:nvPr/>
-        </p:nvCxnSpPr>
-        <p:spPr>
-          <a:xfrm rot="16200000" flipV="1">
-            <a:off x="9945565" y="3053933"/>
-            <a:ext cx="1482837" cy="757846"/>
-          </a:xfrm>
-          <a:prstGeom prst="bentConnector2">
-            <a:avLst/>
-          </a:prstGeom>
-          <a:ln>
-            <a:tailEnd type="arrow"/>
-          </a:ln>
-        </p:spPr>
-        <p:style>
-          <a:lnRef idx="1">
-            <a:schemeClr val="accent1"/>
-          </a:lnRef>
-          <a:fillRef idx="0">
-            <a:schemeClr val="accent1"/>
-          </a:fillRef>
-          <a:effectRef idx="0">
-            <a:schemeClr val="accent1"/>
-          </a:effectRef>
-          <a:fontRef idx="minor">
-            <a:schemeClr val="tx1"/>
-          </a:fontRef>
-        </p:style>
-      </p:cxnSp>
-      <p:cxnSp>
-        <p:nvCxnSpPr>
-          <p:cNvPr id="129" name="Conector reto 128"/>
-          <p:cNvCxnSpPr>
-            <a:stCxn id="162" idx="0"/>
-          </p:cNvCxnSpPr>
-          <p:nvPr/>
-        </p:nvCxnSpPr>
-        <p:spPr>
-          <a:xfrm flipH="1" flipV="1">
-            <a:off x="10201232" y="2265218"/>
-            <a:ext cx="1" cy="306723"/>
-          </a:xfrm>
-          <a:prstGeom prst="line">
-            <a:avLst/>
-          </a:prstGeom>
-        </p:spPr>
-        <p:style>
-          <a:lnRef idx="1">
-            <a:schemeClr val="accent1"/>
-          </a:lnRef>
-          <a:fillRef idx="0">
-            <a:schemeClr val="accent1"/>
-          </a:fillRef>
-          <a:effectRef idx="0">
-            <a:schemeClr val="accent1"/>
-          </a:effectRef>
-          <a:fontRef idx="minor">
-            <a:schemeClr val="tx1"/>
-          </a:fontRef>
-        </p:style>
-      </p:cxnSp>
-      <p:cxnSp>
-        <p:nvCxnSpPr>
-          <p:cNvPr id="134" name="Conector reto 133"/>
-          <p:cNvCxnSpPr/>
-          <p:nvPr/>
-        </p:nvCxnSpPr>
-        <p:spPr>
-          <a:xfrm flipH="1">
-            <a:off x="8541088" y="2265218"/>
-            <a:ext cx="1660146" cy="0"/>
-          </a:xfrm>
-          <a:prstGeom prst="line">
-            <a:avLst/>
-          </a:prstGeom>
-        </p:spPr>
-        <p:style>
-          <a:lnRef idx="1">
-            <a:schemeClr val="accent1"/>
-          </a:lnRef>
-          <a:fillRef idx="0">
-            <a:schemeClr val="accent1"/>
-          </a:fillRef>
-          <a:effectRef idx="0">
-            <a:schemeClr val="accent1"/>
-          </a:effectRef>
-          <a:fontRef idx="minor">
-            <a:schemeClr val="tx1"/>
-          </a:fontRef>
-        </p:style>
-      </p:cxnSp>
-      <p:cxnSp>
-        <p:nvCxnSpPr>
-          <p:cNvPr id="141" name="Conector reto 140"/>
-          <p:cNvCxnSpPr/>
-          <p:nvPr/>
-        </p:nvCxnSpPr>
-        <p:spPr>
-          <a:xfrm flipH="1">
-            <a:off x="8523748" y="2265218"/>
-            <a:ext cx="34681" cy="2396853"/>
-          </a:xfrm>
-          <a:prstGeom prst="line">
-            <a:avLst/>
-          </a:prstGeom>
-        </p:spPr>
-        <p:style>
-          <a:lnRef idx="1">
-            <a:schemeClr val="accent1"/>
-          </a:lnRef>
-          <a:fillRef idx="0">
-            <a:schemeClr val="accent1"/>
-          </a:fillRef>
-          <a:effectRef idx="0">
-            <a:schemeClr val="accent1"/>
-          </a:effectRef>
-          <a:fontRef idx="minor">
-            <a:schemeClr val="tx1"/>
-          </a:fontRef>
-        </p:style>
-      </p:cxnSp>
-      <p:cxnSp>
-        <p:nvCxnSpPr>
-          <p:cNvPr id="145" name="Conector reto 144"/>
-          <p:cNvCxnSpPr/>
-          <p:nvPr/>
-        </p:nvCxnSpPr>
-        <p:spPr>
-          <a:xfrm flipH="1" flipV="1">
-            <a:off x="6489857" y="4603989"/>
-            <a:ext cx="2033891" cy="58082"/>
-          </a:xfrm>
-          <a:prstGeom prst="line">
-            <a:avLst/>
-          </a:prstGeom>
-        </p:spPr>
-        <p:style>
-          <a:lnRef idx="1">
-            <a:schemeClr val="accent1"/>
-          </a:lnRef>
-          <a:fillRef idx="0">
-            <a:schemeClr val="accent1"/>
-          </a:fillRef>
-          <a:effectRef idx="0">
-            <a:schemeClr val="accent1"/>
-          </a:effectRef>
-          <a:fontRef idx="minor">
-            <a:schemeClr val="tx1"/>
-          </a:fontRef>
-        </p:style>
-      </p:cxnSp>
-      <p:cxnSp>
-        <p:nvCxnSpPr>
-          <p:cNvPr id="149" name="Conector de seta reta 148"/>
-          <p:cNvCxnSpPr>
-            <a:endCxn id="46" idx="0"/>
-          </p:cNvCxnSpPr>
-          <p:nvPr/>
-        </p:nvCxnSpPr>
-        <p:spPr>
-          <a:xfrm>
-            <a:off x="6489857" y="4603989"/>
-            <a:ext cx="1" cy="1251287"/>
-          </a:xfrm>
-          <a:prstGeom prst="straightConnector1">
-            <a:avLst/>
-          </a:prstGeom>
-          <a:ln>
-            <a:tailEnd type="arrow"/>
-          </a:ln>
-        </p:spPr>
-        <p:style>
-          <a:lnRef idx="1">
-            <a:schemeClr val="accent1"/>
-          </a:lnRef>
-          <a:fillRef idx="0">
-            <a:schemeClr val="accent1"/>
-          </a:fillRef>
-          <a:effectRef idx="0">
-            <a:schemeClr val="accent1"/>
-          </a:effectRef>
-          <a:fontRef idx="minor">
-            <a:schemeClr val="tx1"/>
-          </a:fontRef>
-        </p:style>
-      </p:cxnSp>
-      <p:sp>
-        <p:nvSpPr>
-          <p:cNvPr id="83" name="CaixaDeTexto 82"/>
-          <p:cNvSpPr txBox="1"/>
-          <p:nvPr/>
-        </p:nvSpPr>
-        <p:spPr>
-          <a:xfrm>
-            <a:off x="3700044" y="5439146"/>
-            <a:ext cx="290464" cy="369332"/>
-          </a:xfrm>
-          <a:prstGeom prst="rect">
-            <a:avLst/>
-          </a:prstGeom>
-          <a:noFill/>
-        </p:spPr>
-        <p:txBody>
-          <a:bodyPr wrap="none" rtlCol="0">
-            <a:spAutoFit/>
-          </a:bodyPr>
-          <a:lstStyle/>
-          <a:p>
-            <a:r>
-              <a:rPr lang="pt-BR" dirty="0"/>
-              <a:t>S</a:t>
-            </a:r>
           </a:p>
         </p:txBody>
       </p:sp>
@@ -11963,16 +10286,7 @@
                 </a:solidFill>
                 <a:latin typeface="Rockwell Condensed" panose="02060603050405020104" pitchFamily="18" charset="0"/>
               </a:rPr>
-              <a:t>Fluxograma </a:t>
-            </a:r>
-            <a:r>
-              <a:rPr lang="pt-BR" sz="3200" dirty="0" smtClean="0">
-                <a:solidFill>
-                  <a:srgbClr val="FF0000"/>
-                </a:solidFill>
-                <a:latin typeface="Rockwell Condensed" panose="02060603050405020104" pitchFamily="18" charset="0"/>
-              </a:rPr>
-              <a:t>da metodologia utilizada no desenvolvimento projeto</a:t>
+              <a:t>Fluxograma da metodologia utilizada no desenvolvimento projeto</a:t>
             </a:r>
             <a:endParaRPr lang="pt-BR" sz="3200" dirty="0">
               <a:solidFill>
@@ -12082,11 +10396,7 @@
             <a:pPr algn="ctr"/>
             <a:r>
               <a:rPr lang="pt-BR" dirty="0" smtClean="0"/>
-              <a:t>Teste individual de cada componente pesquisado foi satisfatório</a:t>
-            </a:r>
-            <a:r>
-              <a:rPr lang="pt-BR" dirty="0" smtClean="0"/>
-              <a:t>?</a:t>
+              <a:t>Teste individual de cada componente pesquisado foi satisfatório?</a:t>
             </a:r>
             <a:endParaRPr lang="pt-BR" dirty="0"/>
           </a:p>
@@ -12657,11 +10967,7 @@
             <a:pPr algn="ctr"/>
             <a:r>
               <a:rPr lang="pt-BR" dirty="0" smtClean="0"/>
-              <a:t>Realização de testes gerais no projeto, satisfatório</a:t>
-            </a:r>
-            <a:r>
-              <a:rPr lang="pt-BR" dirty="0" smtClean="0"/>
-              <a:t>?</a:t>
+              <a:t>Realização de testes gerais no projeto, satisfatório?</a:t>
             </a:r>
             <a:endParaRPr lang="pt-BR" dirty="0"/>
           </a:p>
@@ -21445,7 +19751,7 @@
   <a:extraClrSchemeLst/>
   <a:extLst>
     <a:ext uri="{05A4C25C-085E-4340-85A3-A5531E510DB2}">
-      <thm15:themeFamily xmlns:thm15="http://schemas.microsoft.com/office/thememl/2012/main" xmlns="" name="Office Theme" id="{62F939B6-93AF-4DB8-9C6B-D6C7DFDC589F}" vid="{4A3C46E8-61CC-4603-A589-7422A47A8E4A}"/>
+      <thm15:themeFamily xmlns="" xmlns:thm15="http://schemas.microsoft.com/office/thememl/2012/main" name="Office Theme" id="{62F939B6-93AF-4DB8-9C6B-D6C7DFDC589F}" vid="{4A3C46E8-61CC-4603-A589-7422A47A8E4A}"/>
     </a:ext>
   </a:extLst>
 </a:theme>
@@ -21706,7 +20012,7 @@
   <a:extraClrSchemeLst/>
   <a:extLst>
     <a:ext uri="{05A4C25C-085E-4340-85A3-A5531E510DB2}">
-      <thm15:themeFamily xmlns:thm15="http://schemas.microsoft.com/office/thememl/2012/main" xmlns="" name="Office Theme" id="{62F939B6-93AF-4DB8-9C6B-D6C7DFDC589F}" vid="{4A3C46E8-61CC-4603-A589-7422A47A8E4A}"/>
+      <thm15:themeFamily xmlns="" xmlns:thm15="http://schemas.microsoft.com/office/thememl/2012/main" name="Office Theme" id="{62F939B6-93AF-4DB8-9C6B-D6C7DFDC589F}" vid="{4A3C46E8-61CC-4603-A589-7422A47A8E4A}"/>
     </a:ext>
   </a:extLst>
 </a:theme>

</xml_diff>

<commit_message>
revisão após a entrega da capa dura
</commit_message>
<xml_diff>
--- a/apresentação/Apresentação.pptx
+++ b/apresentação/Apresentação.pptx
@@ -134,7 +134,7 @@
   </p:defaultTextStyle>
   <p:extLst>
     <p:ext uri="{EFAFB233-063F-42B5-8137-9DF3F51BA10A}">
-      <p15:sldGuideLst xmlns="" xmlns:p15="http://schemas.microsoft.com/office/powerpoint/2012/main">
+      <p15:sldGuideLst xmlns:p15="http://schemas.microsoft.com/office/powerpoint/2012/main" xmlns="">
         <p15:guide id="1" orient="horz" pos="2160">
           <p15:clr>
             <a:srgbClr val="A4A3A4"/>
@@ -234,7 +234,7 @@
             <a:fld id="{218263C8-CAE2-452B-807D-4C703AE228A9}" type="datetimeFigureOut">
               <a:rPr lang="pt-BR" smtClean="0"/>
               <a:pPr/>
-              <a:t>06/03/2018</a:t>
+              <a:t>08/03/2018</a:t>
             </a:fld>
             <a:endParaRPr lang="pt-BR"/>
           </a:p>
@@ -720,7 +720,7 @@
             <a:fld id="{1D7B8B0D-CDBB-4942-BC3E-BDC885F34957}" type="datetime1">
               <a:rPr lang="pt-BR" smtClean="0"/>
               <a:pPr/>
-              <a:t>06/03/2018</a:t>
+              <a:t>08/03/2018</a:t>
             </a:fld>
             <a:endParaRPr lang="pt-BR"/>
           </a:p>
@@ -896,7 +896,7 @@
             <a:fld id="{B075492A-4FA5-4A15-91D8-9462636EA097}" type="datetime1">
               <a:rPr lang="pt-BR" smtClean="0"/>
               <a:pPr/>
-              <a:t>06/03/2018</a:t>
+              <a:t>08/03/2018</a:t>
             </a:fld>
             <a:endParaRPr lang="pt-BR"/>
           </a:p>
@@ -1082,7 +1082,7 @@
             <a:fld id="{D7D750F9-D17F-4A3A-B336-82E9E5E36056}" type="datetime1">
               <a:rPr lang="pt-BR" smtClean="0"/>
               <a:pPr/>
-              <a:t>06/03/2018</a:t>
+              <a:t>08/03/2018</a:t>
             </a:fld>
             <a:endParaRPr lang="pt-BR"/>
           </a:p>
@@ -1258,7 +1258,7 @@
             <a:fld id="{F18B65B7-74A1-4119-84DA-90926486EA44}" type="datetime1">
               <a:rPr lang="pt-BR" smtClean="0"/>
               <a:pPr/>
-              <a:t>06/03/2018</a:t>
+              <a:t>08/03/2018</a:t>
             </a:fld>
             <a:endParaRPr lang="pt-BR"/>
           </a:p>
@@ -1540,7 +1540,7 @@
             <a:fld id="{FDD286B5-6D8D-4EA5-8AAB-CDA8C13F810D}" type="datetime1">
               <a:rPr lang="pt-BR" smtClean="0"/>
               <a:pPr/>
-              <a:t>06/03/2018</a:t>
+              <a:t>08/03/2018</a:t>
             </a:fld>
             <a:endParaRPr lang="pt-BR"/>
           </a:p>
@@ -1778,7 +1778,7 @@
             <a:fld id="{BC63E735-0179-41E7-8DC3-74CED378217D}" type="datetime1">
               <a:rPr lang="pt-BR" smtClean="0"/>
               <a:pPr/>
-              <a:t>06/03/2018</a:t>
+              <a:t>08/03/2018</a:t>
             </a:fld>
             <a:endParaRPr lang="pt-BR"/>
           </a:p>
@@ -2151,7 +2151,7 @@
             <a:fld id="{59AA998E-87EE-4A03-B319-74F214514B6B}" type="datetime1">
               <a:rPr lang="pt-BR" smtClean="0"/>
               <a:pPr/>
-              <a:t>06/03/2018</a:t>
+              <a:t>08/03/2018</a:t>
             </a:fld>
             <a:endParaRPr lang="pt-BR"/>
           </a:p>
@@ -2275,7 +2275,7 @@
             <a:fld id="{BEE091FC-907C-4326-AFD0-FCF8C2FCD8C6}" type="datetime1">
               <a:rPr lang="pt-BR" smtClean="0"/>
               <a:pPr/>
-              <a:t>06/03/2018</a:t>
+              <a:t>08/03/2018</a:t>
             </a:fld>
             <a:endParaRPr lang="pt-BR"/>
           </a:p>
@@ -2376,7 +2376,7 @@
             <a:fld id="{88CA3AC6-0146-4B9A-8317-06DA962E26B3}" type="datetime1">
               <a:rPr lang="pt-BR" smtClean="0"/>
               <a:pPr/>
-              <a:t>06/03/2018</a:t>
+              <a:t>08/03/2018</a:t>
             </a:fld>
             <a:endParaRPr lang="pt-BR"/>
           </a:p>
@@ -2659,7 +2659,7 @@
             <a:fld id="{6AA6AB33-8A5F-4EB0-8265-64AD54D2922F}" type="datetime1">
               <a:rPr lang="pt-BR" smtClean="0"/>
               <a:pPr/>
-              <a:t>06/03/2018</a:t>
+              <a:t>08/03/2018</a:t>
             </a:fld>
             <a:endParaRPr lang="pt-BR"/>
           </a:p>
@@ -2918,7 +2918,7 @@
             <a:fld id="{59D83328-E52B-496D-8D9B-1EB9C9BF2321}" type="datetime1">
               <a:rPr lang="pt-BR" smtClean="0"/>
               <a:pPr/>
-              <a:t>06/03/2018</a:t>
+              <a:t>08/03/2018</a:t>
             </a:fld>
             <a:endParaRPr lang="pt-BR"/>
           </a:p>
@@ -3137,7 +3137,7 @@
             <a:fld id="{884AA605-E3A0-4E4E-A893-06E068C17BFB}" type="datetime1">
               <a:rPr lang="pt-BR" smtClean="0"/>
               <a:pPr/>
-              <a:t>06/03/2018</a:t>
+              <a:t>08/03/2018</a:t>
             </a:fld>
             <a:endParaRPr lang="pt-BR"/>
           </a:p>
@@ -5927,24 +5927,18 @@
       </p:sp>
       <p:sp>
         <p:nvSpPr>
-          <p:cNvPr id="10" name="Retângulo 9"/>
+          <p:cNvPr id="2" name="Retângulo 1"/>
           <p:cNvSpPr/>
           <p:nvPr/>
         </p:nvSpPr>
         <p:spPr>
           <a:xfrm>
-            <a:off x="566669" y="1694328"/>
-            <a:ext cx="11050073" cy="4590561"/>
+            <a:off x="3088023" y="2643073"/>
+            <a:ext cx="757253" cy="322118"/>
           </a:xfrm>
           <a:prstGeom prst="rect">
             <a:avLst/>
           </a:prstGeom>
-          <a:noFill/>
-          <a:ln w="28575">
-            <a:solidFill>
-              <a:srgbClr val="7030A0"/>
-            </a:solidFill>
-          </a:ln>
         </p:spPr>
         <p:style>
           <a:lnRef idx="2">
@@ -5967,122 +5961,26 @@
           <a:lstStyle/>
           <a:p>
             <a:pPr algn="ctr"/>
-            <a:endParaRPr lang="pt-BR"/>
-          </a:p>
-        </p:txBody>
-      </p:sp>
-      <p:sp>
-        <p:nvSpPr>
-          <p:cNvPr id="11" name="Título 1"/>
-          <p:cNvSpPr>
-            <a:spLocks noGrp="1"/>
-          </p:cNvSpPr>
-          <p:nvPr>
-            <p:ph type="title"/>
-          </p:nvPr>
-        </p:nvSpPr>
-        <p:spPr>
-          <a:xfrm>
-            <a:off x="3730222" y="1227910"/>
-            <a:ext cx="4291200" cy="948374"/>
-          </a:xfrm>
-          <a:prstGeom prst="flowChartAlternateProcess">
-            <a:avLst/>
-          </a:prstGeom>
-          <a:solidFill>
-            <a:srgbClr val="D7AFFF"/>
-          </a:solidFill>
-        </p:spPr>
-        <p:txBody>
-          <a:bodyPr>
-            <a:normAutofit fontScale="90000"/>
-          </a:bodyPr>
-          <a:lstStyle/>
-          <a:p>
-            <a:pPr algn="ctr"/>
-            <a:r>
-              <a:rPr lang="pt-BR" sz="4000" dirty="0" smtClean="0">
-                <a:latin typeface="Rockwell Condensed" panose="02060603050405020104" pitchFamily="18" charset="0"/>
-                <a:cs typeface="Times New Roman" panose="02020603050405020304" pitchFamily="18" charset="0"/>
-              </a:rPr>
-              <a:t>METODOLOGIA E DESENVOLVIMENTO</a:t>
-            </a:r>
-            <a:endParaRPr lang="pt-BR" sz="4000" dirty="0">
-              <a:latin typeface="Rockwell Condensed" panose="02060603050405020104" pitchFamily="18" charset="0"/>
-              <a:cs typeface="Times New Roman" panose="02020603050405020304" pitchFamily="18" charset="0"/>
-            </a:endParaRPr>
-          </a:p>
-        </p:txBody>
-      </p:sp>
-      <p:sp>
-        <p:nvSpPr>
-          <p:cNvPr id="17" name="Retângulo 16"/>
+            <a:r>
+              <a:rPr lang="pt-BR" dirty="0" smtClean="0"/>
+              <a:t>inicio</a:t>
+            </a:r>
+            <a:endParaRPr lang="pt-BR" dirty="0"/>
+          </a:p>
+        </p:txBody>
+      </p:sp>
+      <p:sp>
+        <p:nvSpPr>
+          <p:cNvPr id="3" name="Elipse 2"/>
           <p:cNvSpPr/>
           <p:nvPr/>
         </p:nvSpPr>
         <p:spPr>
           <a:xfrm>
-            <a:off x="874120" y="2176284"/>
-            <a:ext cx="9990085" cy="1508105"/>
-          </a:xfrm>
-          <a:prstGeom prst="rect">
-            <a:avLst/>
-          </a:prstGeom>
-        </p:spPr>
-        <p:txBody>
-          <a:bodyPr wrap="square">
-            <a:spAutoFit/>
-          </a:bodyPr>
-          <a:lstStyle/>
-          <a:p>
-            <a:pPr marL="109728" algn="ctr"/>
-            <a:r>
-              <a:rPr lang="pt-BR" sz="3200" dirty="0" smtClean="0">
-                <a:solidFill>
-                  <a:srgbClr val="FF0000"/>
-                </a:solidFill>
-                <a:latin typeface="Rockwell Condensed" panose="02060603050405020104" pitchFamily="18" charset="0"/>
-              </a:rPr>
-              <a:t>Fluxograma de funcionamento</a:t>
-            </a:r>
-            <a:endParaRPr lang="pt-BR" sz="3200" dirty="0">
-              <a:solidFill>
-                <a:srgbClr val="FF0000"/>
-              </a:solidFill>
-              <a:latin typeface="Rockwell Condensed" panose="02060603050405020104" pitchFamily="18" charset="0"/>
-            </a:endParaRPr>
-          </a:p>
-          <a:p>
-            <a:pPr marL="109728" algn="ctr"/>
-            <a:endParaRPr lang="pt-BR" sz="3200" dirty="0">
-              <a:solidFill>
-                <a:srgbClr val="FF0000"/>
-              </a:solidFill>
-              <a:latin typeface="Rockwell Condensed" panose="02060603050405020104" pitchFamily="18" charset="0"/>
-            </a:endParaRPr>
-          </a:p>
-          <a:p>
-            <a:pPr marL="109728" indent="0" algn="ctr">
-              <a:buNone/>
-            </a:pPr>
-            <a:endParaRPr lang="pt-BR" sz="2800" dirty="0" smtClean="0">
-              <a:latin typeface="Rockwell Condensed" panose="02060603050405020104" pitchFamily="18" charset="0"/>
-            </a:endParaRPr>
-          </a:p>
-        </p:txBody>
-      </p:sp>
-      <p:sp>
-        <p:nvSpPr>
-          <p:cNvPr id="2" name="Retângulo 1"/>
-          <p:cNvSpPr/>
-          <p:nvPr/>
-        </p:nvSpPr>
-        <p:spPr>
-          <a:xfrm>
-            <a:off x="3088023" y="2643073"/>
-            <a:ext cx="757253" cy="322118"/>
-          </a:xfrm>
-          <a:prstGeom prst="rect">
+            <a:off x="3362739" y="3214473"/>
+            <a:ext cx="213655" cy="238991"/>
+          </a:xfrm>
+          <a:prstGeom prst="ellipse">
             <a:avLst/>
           </a:prstGeom>
         </p:spPr>
@@ -6108,25 +6006,60 @@
           <a:p>
             <a:pPr algn="ctr"/>
             <a:r>
-              <a:rPr lang="pt-BR" dirty="0" smtClean="0"/>
-              <a:t>inicio</a:t>
-            </a:r>
-            <a:endParaRPr lang="pt-BR" dirty="0"/>
-          </a:p>
-        </p:txBody>
-      </p:sp>
-      <p:sp>
-        <p:nvSpPr>
-          <p:cNvPr id="3" name="Elipse 2"/>
+              <a:rPr lang="pt-BR" dirty="0"/>
+              <a:t>A</a:t>
+            </a:r>
+          </a:p>
+        </p:txBody>
+      </p:sp>
+      <p:cxnSp>
+        <p:nvCxnSpPr>
+          <p:cNvPr id="6" name="Conector de seta reta 5"/>
+          <p:cNvCxnSpPr>
+            <a:stCxn id="2" idx="2"/>
+            <a:endCxn id="3" idx="0"/>
+          </p:cNvCxnSpPr>
+          <p:nvPr/>
+        </p:nvCxnSpPr>
+        <p:spPr>
+          <a:xfrm>
+            <a:off x="3466650" y="2965191"/>
+            <a:ext cx="2917" cy="249282"/>
+          </a:xfrm>
+          <a:prstGeom prst="straightConnector1">
+            <a:avLst/>
+          </a:prstGeom>
+          <a:ln>
+            <a:tailEnd type="arrow"/>
+          </a:ln>
+        </p:spPr>
+        <p:style>
+          <a:lnRef idx="1">
+            <a:schemeClr val="accent1"/>
+          </a:lnRef>
+          <a:fillRef idx="0">
+            <a:schemeClr val="accent1"/>
+          </a:fillRef>
+          <a:effectRef idx="0">
+            <a:schemeClr val="accent1"/>
+          </a:effectRef>
+          <a:fontRef idx="minor">
+            <a:schemeClr val="tx1"/>
+          </a:fontRef>
+        </p:style>
+      </p:cxnSp>
+      <p:sp>
+        <p:nvSpPr>
+          <p:cNvPr id="7" name="Losango 6"/>
           <p:cNvSpPr/>
           <p:nvPr/>
         </p:nvSpPr>
         <p:spPr>
           <a:xfrm>
-            <a:off x="3362739" y="3214473"/>
-            <a:ext cx="213655" cy="238991"/>
-          </a:xfrm>
-          <a:prstGeom prst="ellipse">
+            <a:off x="2805618" y="3673296"/>
+            <a:ext cx="1327897" cy="843045"/>
+          </a:xfrm>
+          <a:prstGeom prst="diamond">
             <a:avLst/>
           </a:prstGeom>
         </p:spPr>
@@ -6152,95 +6085,8 @@
           <a:p>
             <a:pPr algn="ctr"/>
             <a:r>
-              <a:rPr lang="pt-BR" dirty="0"/>
-              <a:t>A</a:t>
-            </a:r>
-          </a:p>
-        </p:txBody>
-      </p:sp>
-      <p:cxnSp>
-        <p:nvCxnSpPr>
-          <p:cNvPr id="6" name="Conector de seta reta 5"/>
-          <p:cNvCxnSpPr>
-            <a:stCxn id="2" idx="2"/>
-            <a:endCxn id="3" idx="0"/>
-          </p:cNvCxnSpPr>
-          <p:nvPr/>
-        </p:nvCxnSpPr>
-        <p:spPr>
-          <a:xfrm>
-            <a:off x="3466650" y="2965191"/>
-            <a:ext cx="2917" cy="249282"/>
-          </a:xfrm>
-          <a:prstGeom prst="straightConnector1">
-            <a:avLst/>
-          </a:prstGeom>
-          <a:ln>
-            <a:tailEnd type="arrow"/>
-          </a:ln>
-        </p:spPr>
-        <p:style>
-          <a:lnRef idx="1">
-            <a:schemeClr val="accent1"/>
-          </a:lnRef>
-          <a:fillRef idx="0">
-            <a:schemeClr val="accent1"/>
-          </a:fillRef>
-          <a:effectRef idx="0">
-            <a:schemeClr val="accent1"/>
-          </a:effectRef>
-          <a:fontRef idx="minor">
-            <a:schemeClr val="tx1"/>
-          </a:fontRef>
-        </p:style>
-      </p:cxnSp>
-      <p:sp>
-        <p:nvSpPr>
-          <p:cNvPr id="7" name="Losango 6"/>
-          <p:cNvSpPr/>
-          <p:nvPr/>
-        </p:nvSpPr>
-        <p:spPr>
-          <a:xfrm>
-            <a:off x="2805618" y="3673296"/>
-            <a:ext cx="1327897" cy="843045"/>
-          </a:xfrm>
-          <a:prstGeom prst="diamond">
-            <a:avLst/>
-          </a:prstGeom>
-        </p:spPr>
-        <p:style>
-          <a:lnRef idx="2">
-            <a:schemeClr val="accent1">
-              <a:shade val="50000"/>
-            </a:schemeClr>
-          </a:lnRef>
-          <a:fillRef idx="1">
-            <a:schemeClr val="accent1"/>
-          </a:fillRef>
-          <a:effectRef idx="0">
-            <a:schemeClr val="accent1"/>
-          </a:effectRef>
-          <a:fontRef idx="minor">
-            <a:schemeClr val="lt1"/>
-          </a:fontRef>
-        </p:style>
-        <p:txBody>
-          <a:bodyPr rtlCol="0" anchor="ctr"/>
-          <a:lstStyle/>
-          <a:p>
-            <a:pPr algn="ctr"/>
-            <a:r>
               <a:rPr lang="pt-BR" dirty="0" smtClean="0"/>
-              <a:t>Tem </a:t>
-            </a:r>
-            <a:r>
-              <a:rPr lang="pt-BR" dirty="0" err="1" smtClean="0"/>
-              <a:t>tag</a:t>
-            </a:r>
-            <a:r>
-              <a:rPr lang="pt-BR" dirty="0" smtClean="0"/>
-              <a:t>?</a:t>
+              <a:t>Tem tag?</a:t>
             </a:r>
             <a:endParaRPr lang="pt-BR" dirty="0"/>
           </a:p>
@@ -6559,15 +6405,7 @@
             <a:pPr algn="ctr"/>
             <a:r>
               <a:rPr lang="pt-BR" dirty="0" smtClean="0"/>
-              <a:t>É o </a:t>
-            </a:r>
-            <a:r>
-              <a:rPr lang="pt-BR" dirty="0" err="1" smtClean="0"/>
-              <a:t>Adm</a:t>
-            </a:r>
-            <a:r>
-              <a:rPr lang="pt-BR" dirty="0" smtClean="0"/>
-              <a:t>?</a:t>
+              <a:t>É o Adm?</a:t>
             </a:r>
             <a:endParaRPr lang="pt-BR" dirty="0"/>
           </a:p>
@@ -6977,12 +6815,12 @@
           <a:p>
             <a:pPr algn="ctr"/>
             <a:r>
-              <a:rPr lang="pt-BR" dirty="0" err="1" smtClean="0"/>
-              <a:t>Tag</a:t>
-            </a:r>
-            <a:r>
               <a:rPr lang="pt-BR" dirty="0" smtClean="0"/>
-              <a:t> habilitada?</a:t>
+              <a:t>Tag </a:t>
+            </a:r>
+            <a:r>
+              <a:rPr lang="pt-BR" dirty="0" smtClean="0"/>
+              <a:t>habilitada?</a:t>
             </a:r>
             <a:endParaRPr lang="pt-BR" dirty="0"/>
           </a:p>
@@ -7397,12 +7235,12 @@
           <a:p>
             <a:pPr algn="ctr"/>
             <a:r>
-              <a:rPr lang="pt-BR" dirty="0" err="1" smtClean="0"/>
-              <a:t>Tag</a:t>
-            </a:r>
-            <a:r>
               <a:rPr lang="pt-BR" dirty="0" smtClean="0"/>
-              <a:t> cadastrada?</a:t>
+              <a:t>Tag </a:t>
+            </a:r>
+            <a:r>
+              <a:rPr lang="pt-BR" dirty="0" smtClean="0"/>
+              <a:t>cadastrada?</a:t>
             </a:r>
             <a:endParaRPr lang="pt-BR" dirty="0"/>
           </a:p>
@@ -7816,15 +7654,7 @@
             <a:pPr algn="ctr"/>
             <a:r>
               <a:rPr lang="pt-BR" dirty="0" smtClean="0"/>
-              <a:t>Tem </a:t>
-            </a:r>
-            <a:r>
-              <a:rPr lang="pt-BR" dirty="0" err="1" smtClean="0"/>
-              <a:t>tag</a:t>
-            </a:r>
-            <a:r>
-              <a:rPr lang="pt-BR" dirty="0" smtClean="0"/>
-              <a:t>?</a:t>
+              <a:t>Tem tag?</a:t>
             </a:r>
             <a:endParaRPr lang="pt-BR" dirty="0"/>
           </a:p>
@@ -7946,15 +7776,7 @@
             <a:pPr algn="ctr"/>
             <a:r>
               <a:rPr lang="pt-BR" dirty="0" smtClean="0"/>
-              <a:t>É o </a:t>
-            </a:r>
-            <a:r>
-              <a:rPr lang="pt-BR" dirty="0" err="1" smtClean="0"/>
-              <a:t>Adm</a:t>
-            </a:r>
-            <a:r>
-              <a:rPr lang="pt-BR" dirty="0" smtClean="0"/>
-              <a:t>?</a:t>
+              <a:t>É o Adm?</a:t>
             </a:r>
             <a:endParaRPr lang="pt-BR" dirty="0"/>
           </a:p>
@@ -8062,12 +7884,12 @@
           <a:p>
             <a:pPr algn="ctr"/>
             <a:r>
-              <a:rPr lang="pt-BR" dirty="0" err="1" smtClean="0"/>
-              <a:t>Tag</a:t>
-            </a:r>
-            <a:r>
               <a:rPr lang="pt-BR" dirty="0" smtClean="0"/>
-              <a:t> existe?</a:t>
+              <a:t>Tag </a:t>
+            </a:r>
+            <a:r>
+              <a:rPr lang="pt-BR" dirty="0" smtClean="0"/>
+              <a:t>existe?</a:t>
             </a:r>
             <a:endParaRPr lang="pt-BR" dirty="0"/>
           </a:p>
@@ -8344,11 +8166,7 @@
             <a:pPr algn="ctr"/>
             <a:r>
               <a:rPr lang="pt-BR" dirty="0" smtClean="0"/>
-              <a:t>Apaga </a:t>
-            </a:r>
-            <a:r>
-              <a:rPr lang="pt-BR" dirty="0" err="1" smtClean="0"/>
-              <a:t>tag</a:t>
+              <a:t>Apaga tag</a:t>
             </a:r>
             <a:endParaRPr lang="pt-BR" dirty="0"/>
           </a:p>
@@ -8457,11 +8275,7 @@
             <a:pPr algn="ctr"/>
             <a:r>
               <a:rPr lang="pt-BR" dirty="0" smtClean="0"/>
-              <a:t>insere </a:t>
-            </a:r>
-            <a:r>
-              <a:rPr lang="pt-BR" dirty="0" err="1" smtClean="0"/>
-              <a:t>tag</a:t>
+              <a:t>insere tag</a:t>
             </a:r>
             <a:endParaRPr lang="pt-BR" dirty="0"/>
           </a:p>
@@ -9053,15 +8867,7 @@
             <a:pPr algn="ctr"/>
             <a:r>
               <a:rPr lang="pt-BR" dirty="0" smtClean="0"/>
-              <a:t>Tem </a:t>
-            </a:r>
-            <a:r>
-              <a:rPr lang="pt-BR" dirty="0" err="1" smtClean="0"/>
-              <a:t>tag</a:t>
-            </a:r>
-            <a:r>
-              <a:rPr lang="pt-BR" dirty="0" smtClean="0"/>
-              <a:t>?</a:t>
+              <a:t>Tem tag?</a:t>
             </a:r>
             <a:endParaRPr lang="pt-BR" dirty="0"/>
           </a:p>
@@ -9383,15 +9189,7 @@
             <a:pPr algn="ctr"/>
             <a:r>
               <a:rPr lang="pt-BR" dirty="0" smtClean="0"/>
-              <a:t>Envia a </a:t>
-            </a:r>
-            <a:r>
-              <a:rPr lang="pt-BR" dirty="0" err="1" smtClean="0"/>
-              <a:t>tag</a:t>
-            </a:r>
-            <a:r>
-              <a:rPr lang="pt-BR" dirty="0" smtClean="0"/>
-              <a:t> para o servidor.</a:t>
+              <a:t>Envia a tag para o servidor.</a:t>
             </a:r>
             <a:endParaRPr lang="pt-BR" dirty="0"/>
           </a:p>
@@ -9500,15 +9298,7 @@
             <a:pPr algn="ctr"/>
             <a:r>
               <a:rPr lang="pt-BR" dirty="0" smtClean="0"/>
-              <a:t>Erro ao enviar a </a:t>
-            </a:r>
-            <a:r>
-              <a:rPr lang="pt-BR" dirty="0" err="1" smtClean="0"/>
-              <a:t>tag</a:t>
-            </a:r>
-            <a:r>
-              <a:rPr lang="pt-BR" dirty="0" smtClean="0"/>
-              <a:t> para o servidor</a:t>
+              <a:t>Erro ao enviar a tag para o servidor</a:t>
             </a:r>
             <a:endParaRPr lang="pt-BR" dirty="0"/>
           </a:p>
@@ -9552,15 +9342,7 @@
             <a:pPr algn="ctr"/>
             <a:r>
               <a:rPr lang="pt-BR" dirty="0" smtClean="0"/>
-              <a:t>Acende o </a:t>
-            </a:r>
-            <a:r>
-              <a:rPr lang="pt-BR" dirty="0" err="1" smtClean="0"/>
-              <a:t>led</a:t>
-            </a:r>
-            <a:r>
-              <a:rPr lang="pt-BR" dirty="0" smtClean="0"/>
-              <a:t> vermelho</a:t>
+              <a:t>Acende o led vermelho</a:t>
             </a:r>
             <a:endParaRPr lang="pt-BR" dirty="0"/>
           </a:p>
@@ -9720,15 +9502,7 @@
             <a:pPr algn="ctr"/>
             <a:r>
               <a:rPr lang="pt-BR" dirty="0" smtClean="0"/>
-              <a:t>Acende o </a:t>
-            </a:r>
-            <a:r>
-              <a:rPr lang="pt-BR" dirty="0" err="1" smtClean="0"/>
-              <a:t>led</a:t>
-            </a:r>
-            <a:r>
-              <a:rPr lang="pt-BR" dirty="0" smtClean="0"/>
-              <a:t> verde</a:t>
+              <a:t>Acende o led verde</a:t>
             </a:r>
             <a:endParaRPr lang="pt-BR" dirty="0"/>
           </a:p>
@@ -9808,11 +9582,7 @@
             <a:pPr algn="ctr"/>
             <a:r>
               <a:rPr lang="pt-BR" dirty="0" smtClean="0"/>
-              <a:t>Inseriu no banco de dados</a:t>
-            </a:r>
-            <a:r>
-              <a:rPr lang="pt-BR" dirty="0" smtClean="0"/>
-              <a:t>?</a:t>
+              <a:t>Inseriu no banco de dados?</a:t>
             </a:r>
             <a:endParaRPr lang="pt-BR" dirty="0"/>
           </a:p>
@@ -9892,15 +9662,7 @@
             <a:pPr algn="ctr"/>
             <a:r>
               <a:rPr lang="pt-BR" dirty="0" smtClean="0"/>
-              <a:t>Acende o </a:t>
-            </a:r>
-            <a:r>
-              <a:rPr lang="pt-BR" dirty="0" err="1" smtClean="0"/>
-              <a:t>led</a:t>
-            </a:r>
-            <a:r>
-              <a:rPr lang="pt-BR" dirty="0" smtClean="0"/>
-              <a:t> vermelho</a:t>
+              <a:t>Acende o led vermelho</a:t>
             </a:r>
             <a:endParaRPr lang="pt-BR" dirty="0"/>
           </a:p>
@@ -10160,160 +9922,6 @@
           <a:chExt cx="0" cy="0"/>
         </a:xfrm>
       </p:grpSpPr>
-      <p:sp>
-        <p:nvSpPr>
-          <p:cNvPr id="5" name="Espaço Reservado para Número de Slide 4"/>
-          <p:cNvSpPr>
-            <a:spLocks noGrp="1"/>
-          </p:cNvSpPr>
-          <p:nvPr>
-            <p:ph type="sldNum" sz="quarter" idx="12"/>
-          </p:nvPr>
-        </p:nvSpPr>
-        <p:spPr/>
-        <p:txBody>
-          <a:bodyPr/>
-          <a:lstStyle/>
-          <a:p>
-            <a:fld id="{07E976CE-6A88-4DF5-9FE0-D445D452ABB2}" type="slidenum">
-              <a:rPr lang="pt-BR" smtClean="0"/>
-              <a:t>16</a:t>
-            </a:fld>
-            <a:endParaRPr lang="pt-BR" dirty="0"/>
-          </a:p>
-        </p:txBody>
-      </p:sp>
-      <p:sp>
-        <p:nvSpPr>
-          <p:cNvPr id="8" name="Espaço Reservado para Rodapé 9"/>
-          <p:cNvSpPr>
-            <a:spLocks noGrp="1"/>
-          </p:cNvSpPr>
-          <p:nvPr>
-            <p:ph type="ftr" sz="quarter" idx="11"/>
-          </p:nvPr>
-        </p:nvSpPr>
-        <p:spPr>
-          <a:xfrm>
-            <a:off x="4034305" y="6377132"/>
-            <a:ext cx="4114800" cy="365125"/>
-          </a:xfrm>
-        </p:spPr>
-        <p:txBody>
-          <a:bodyPr/>
-          <a:lstStyle/>
-          <a:p>
-            <a:r>
-              <a:rPr lang="pt-BR" dirty="0" smtClean="0"/>
-              <a:t>Manaus (AM) – Fevereiro de 2018</a:t>
-            </a:r>
-            <a:endParaRPr lang="pt-BR" dirty="0"/>
-          </a:p>
-        </p:txBody>
-      </p:sp>
-      <p:sp>
-        <p:nvSpPr>
-          <p:cNvPr id="10" name="Retângulo 9"/>
-          <p:cNvSpPr/>
-          <p:nvPr/>
-        </p:nvSpPr>
-        <p:spPr>
-          <a:xfrm>
-            <a:off x="566669" y="1694328"/>
-            <a:ext cx="11050073" cy="4590561"/>
-          </a:xfrm>
-          <a:prstGeom prst="rect">
-            <a:avLst/>
-          </a:prstGeom>
-          <a:noFill/>
-          <a:ln w="28575">
-            <a:solidFill>
-              <a:srgbClr val="7030A0"/>
-            </a:solidFill>
-          </a:ln>
-        </p:spPr>
-        <p:style>
-          <a:lnRef idx="2">
-            <a:schemeClr val="accent1">
-              <a:shade val="50000"/>
-            </a:schemeClr>
-          </a:lnRef>
-          <a:fillRef idx="1">
-            <a:schemeClr val="accent1"/>
-          </a:fillRef>
-          <a:effectRef idx="0">
-            <a:schemeClr val="accent1"/>
-          </a:effectRef>
-          <a:fontRef idx="minor">
-            <a:schemeClr val="lt1"/>
-          </a:fontRef>
-        </p:style>
-        <p:txBody>
-          <a:bodyPr rtlCol="0" anchor="ctr"/>
-          <a:lstStyle/>
-          <a:p>
-            <a:pPr algn="ctr"/>
-            <a:endParaRPr lang="pt-BR"/>
-          </a:p>
-        </p:txBody>
-      </p:sp>
-      <p:sp>
-        <p:nvSpPr>
-          <p:cNvPr id="17" name="Retângulo 16"/>
-          <p:cNvSpPr/>
-          <p:nvPr/>
-        </p:nvSpPr>
-        <p:spPr>
-          <a:xfrm>
-            <a:off x="1037639" y="1694328"/>
-            <a:ext cx="9990085" cy="1508105"/>
-          </a:xfrm>
-          <a:prstGeom prst="rect">
-            <a:avLst/>
-          </a:prstGeom>
-        </p:spPr>
-        <p:txBody>
-          <a:bodyPr wrap="square">
-            <a:spAutoFit/>
-          </a:bodyPr>
-          <a:lstStyle/>
-          <a:p>
-            <a:pPr marL="109728" algn="ctr"/>
-            <a:r>
-              <a:rPr lang="pt-BR" sz="3200" dirty="0" smtClean="0">
-                <a:solidFill>
-                  <a:srgbClr val="FF0000"/>
-                </a:solidFill>
-                <a:latin typeface="Rockwell Condensed" panose="02060603050405020104" pitchFamily="18" charset="0"/>
-              </a:rPr>
-              <a:t>Fluxograma da metodologia utilizada no desenvolvimento projeto</a:t>
-            </a:r>
-            <a:endParaRPr lang="pt-BR" sz="3200" dirty="0">
-              <a:solidFill>
-                <a:srgbClr val="FF0000"/>
-              </a:solidFill>
-              <a:latin typeface="Rockwell Condensed" panose="02060603050405020104" pitchFamily="18" charset="0"/>
-            </a:endParaRPr>
-          </a:p>
-          <a:p>
-            <a:pPr marL="109728" algn="ctr"/>
-            <a:endParaRPr lang="pt-BR" sz="3200" dirty="0">
-              <a:solidFill>
-                <a:srgbClr val="FF0000"/>
-              </a:solidFill>
-              <a:latin typeface="Rockwell Condensed" panose="02060603050405020104" pitchFamily="18" charset="0"/>
-            </a:endParaRPr>
-          </a:p>
-          <a:p>
-            <a:pPr marL="109728" indent="0" algn="ctr">
-              <a:buNone/>
-            </a:pPr>
-            <a:endParaRPr lang="pt-BR" sz="2800" dirty="0" smtClean="0">
-              <a:latin typeface="Rockwell Condensed" panose="02060603050405020104" pitchFamily="18" charset="0"/>
-            </a:endParaRPr>
-          </a:p>
-        </p:txBody>
-      </p:sp>
       <p:sp>
         <p:nvSpPr>
           <p:cNvPr id="2" name="Retângulo 1"/>
@@ -19751,7 +19359,7 @@
   <a:extraClrSchemeLst/>
   <a:extLst>
     <a:ext uri="{05A4C25C-085E-4340-85A3-A5531E510DB2}">
-      <thm15:themeFamily xmlns="" xmlns:thm15="http://schemas.microsoft.com/office/thememl/2012/main" name="Office Theme" id="{62F939B6-93AF-4DB8-9C6B-D6C7DFDC589F}" vid="{4A3C46E8-61CC-4603-A589-7422A47A8E4A}"/>
+      <thm15:themeFamily xmlns:thm15="http://schemas.microsoft.com/office/thememl/2012/main" xmlns="" name="Office Theme" id="{62F939B6-93AF-4DB8-9C6B-D6C7DFDC589F}" vid="{4A3C46E8-61CC-4603-A589-7422A47A8E4A}"/>
     </a:ext>
   </a:extLst>
 </a:theme>
@@ -20012,7 +19620,7 @@
   <a:extraClrSchemeLst/>
   <a:extLst>
     <a:ext uri="{05A4C25C-085E-4340-85A3-A5531E510DB2}">
-      <thm15:themeFamily xmlns="" xmlns:thm15="http://schemas.microsoft.com/office/thememl/2012/main" name="Office Theme" id="{62F939B6-93AF-4DB8-9C6B-D6C7DFDC589F}" vid="{4A3C46E8-61CC-4603-A589-7422A47A8E4A}"/>
+      <thm15:themeFamily xmlns:thm15="http://schemas.microsoft.com/office/thememl/2012/main" xmlns="" name="Office Theme" id="{62F939B6-93AF-4DB8-9C6B-D6C7DFDC589F}" vid="{4A3C46E8-61CC-4603-A589-7422A47A8E4A}"/>
     </a:ext>
   </a:extLst>
 </a:theme>

</xml_diff>